<commit_message>
second draft of the ty course
</commit_message>
<xml_diff>
--- a/topic05/talk-1/a-processing-mouse-events.pptx
+++ b/topic05/talk-1/a-processing-mouse-events.pptx
@@ -5,36 +5,25 @@
     <p:sldMasterId id="2147483648" r:id="rId1"/>
   </p:sldMasterIdLst>
   <p:notesMasterIdLst>
-    <p:notesMasterId r:id="rId29"/>
+    <p:notesMasterId r:id="rId18"/>
   </p:notesMasterIdLst>
   <p:sldIdLst>
     <p:sldId id="323" r:id="rId2"/>
-    <p:sldId id="257" r:id="rId3"/>
-    <p:sldId id="305" r:id="rId4"/>
-    <p:sldId id="302" r:id="rId5"/>
-    <p:sldId id="318" r:id="rId6"/>
-    <p:sldId id="301" r:id="rId7"/>
-    <p:sldId id="296" r:id="rId8"/>
-    <p:sldId id="303" r:id="rId9"/>
-    <p:sldId id="298" r:id="rId10"/>
-    <p:sldId id="304" r:id="rId11"/>
-    <p:sldId id="299" r:id="rId12"/>
-    <p:sldId id="307" r:id="rId13"/>
-    <p:sldId id="300" r:id="rId14"/>
-    <p:sldId id="308" r:id="rId15"/>
-    <p:sldId id="321" r:id="rId16"/>
-    <p:sldId id="311" r:id="rId17"/>
-    <p:sldId id="313" r:id="rId18"/>
-    <p:sldId id="312" r:id="rId19"/>
-    <p:sldId id="319" r:id="rId20"/>
-    <p:sldId id="320" r:id="rId21"/>
-    <p:sldId id="297" r:id="rId22"/>
-    <p:sldId id="322" r:id="rId23"/>
-    <p:sldId id="283" r:id="rId24"/>
-    <p:sldId id="317" r:id="rId25"/>
-    <p:sldId id="273" r:id="rId26"/>
-    <p:sldId id="306" r:id="rId27"/>
-    <p:sldId id="274" r:id="rId28"/>
+    <p:sldId id="305" r:id="rId3"/>
+    <p:sldId id="302" r:id="rId4"/>
+    <p:sldId id="318" r:id="rId5"/>
+    <p:sldId id="301" r:id="rId6"/>
+    <p:sldId id="296" r:id="rId7"/>
+    <p:sldId id="303" r:id="rId8"/>
+    <p:sldId id="298" r:id="rId9"/>
+    <p:sldId id="304" r:id="rId10"/>
+    <p:sldId id="299" r:id="rId11"/>
+    <p:sldId id="307" r:id="rId12"/>
+    <p:sldId id="300" r:id="rId13"/>
+    <p:sldId id="308" r:id="rId14"/>
+    <p:sldId id="273" r:id="rId15"/>
+    <p:sldId id="306" r:id="rId16"/>
+    <p:sldId id="274" r:id="rId17"/>
   </p:sldIdLst>
   <p:sldSz cx="9144000" cy="6858000" type="screen4x3"/>
   <p:notesSz cx="6858000" cy="9144000"/>
@@ -218,7 +207,7 @@
           <a:p>
             <a:fld id="{58C3D141-1E1C-433C-AD3A-CD56CBBB4F9F}" type="datetimeFigureOut">
               <a:rPr lang="en-IE" smtClean="0"/>
-              <a:t>14/01/2016</a:t>
+              <a:t>18/01/2016</a:t>
             </a:fld>
             <a:endParaRPr lang="en-IE"/>
           </a:p>
@@ -486,568 +475,6 @@
 </p:notesMaster>
 </file>
 
-<file path=ppt/notesSlides/notesSlide1.xml><?xml version="1.0" encoding="utf-8"?>
-<p:notes xmlns:a="http://schemas.openxmlformats.org/drawingml/2006/main" xmlns:r="http://schemas.openxmlformats.org/officeDocument/2006/relationships" xmlns:p="http://schemas.openxmlformats.org/presentationml/2006/main">
-  <p:cSld>
-    <p:spTree>
-      <p:nvGrpSpPr>
-        <p:cNvPr id="1" name=""/>
-        <p:cNvGrpSpPr/>
-        <p:nvPr/>
-      </p:nvGrpSpPr>
-      <p:grpSpPr>
-        <a:xfrm>
-          <a:off x="0" y="0"/>
-          <a:ext cx="0" cy="0"/>
-          <a:chOff x="0" y="0"/>
-          <a:chExt cx="0" cy="0"/>
-        </a:xfrm>
-      </p:grpSpPr>
-      <p:sp>
-        <p:nvSpPr>
-          <p:cNvPr id="2" name="Slide Image Placeholder 1"/>
-          <p:cNvSpPr>
-            <a:spLocks noGrp="1" noRot="1" noChangeAspect="1"/>
-          </p:cNvSpPr>
-          <p:nvPr>
-            <p:ph type="sldImg"/>
-          </p:nvPr>
-        </p:nvSpPr>
-        <p:spPr/>
-      </p:sp>
-      <p:sp>
-        <p:nvSpPr>
-          <p:cNvPr id="3" name="Notes Placeholder 2"/>
-          <p:cNvSpPr>
-            <a:spLocks noGrp="1"/>
-          </p:cNvSpPr>
-          <p:nvPr>
-            <p:ph type="body" idx="1"/>
-          </p:nvPr>
-        </p:nvSpPr>
-        <p:spPr/>
-        <p:txBody>
-          <a:bodyPr/>
-          <a:lstStyle/>
-          <a:p>
-            <a:r>
-              <a:rPr lang="en-IE" dirty="0" smtClean="0"/>
-              <a:t>size(500, 400);</a:t>
-            </a:r>
-          </a:p>
-          <a:p>
-            <a:r>
-              <a:rPr lang="en-IE" dirty="0" smtClean="0"/>
-              <a:t>background(0);</a:t>
-            </a:r>
-          </a:p>
-          <a:p>
-            <a:r>
-              <a:rPr lang="en-IE" dirty="0" smtClean="0"/>
-              <a:t>stroke(153);</a:t>
-            </a:r>
-          </a:p>
-          <a:p>
-            <a:r>
-              <a:rPr lang="en-IE" dirty="0" err="1" smtClean="0"/>
-              <a:t>strokeWeight</a:t>
-            </a:r>
-            <a:r>
-              <a:rPr lang="en-IE" dirty="0" smtClean="0"/>
-              <a:t>(4);</a:t>
-            </a:r>
-          </a:p>
-          <a:p>
-            <a:endParaRPr lang="en-IE" dirty="0" smtClean="0"/>
-          </a:p>
-          <a:p>
-            <a:r>
-              <a:rPr lang="en-IE" dirty="0" err="1" smtClean="0"/>
-              <a:t>int</a:t>
-            </a:r>
-            <a:r>
-              <a:rPr lang="en-IE" dirty="0" smtClean="0"/>
-              <a:t> a = 50;</a:t>
-            </a:r>
-          </a:p>
-          <a:p>
-            <a:r>
-              <a:rPr lang="en-IE" dirty="0" err="1" smtClean="0"/>
-              <a:t>int</a:t>
-            </a:r>
-            <a:r>
-              <a:rPr lang="en-IE" dirty="0" smtClean="0"/>
-              <a:t> b = 120;</a:t>
-            </a:r>
-          </a:p>
-          <a:p>
-            <a:r>
-              <a:rPr lang="en-IE" dirty="0" err="1" smtClean="0"/>
-              <a:t>int</a:t>
-            </a:r>
-            <a:r>
-              <a:rPr lang="en-IE" dirty="0" smtClean="0"/>
-              <a:t> c = 180;</a:t>
-            </a:r>
-          </a:p>
-          <a:p>
-            <a:endParaRPr lang="en-IE" dirty="0" smtClean="0"/>
-          </a:p>
-          <a:p>
-            <a:r>
-              <a:rPr lang="en-IE" dirty="0" smtClean="0"/>
-              <a:t>line(a, b, </a:t>
-            </a:r>
-            <a:r>
-              <a:rPr lang="en-IE" dirty="0" err="1" smtClean="0"/>
-              <a:t>a+c</a:t>
-            </a:r>
-            <a:r>
-              <a:rPr lang="en-IE" dirty="0" smtClean="0"/>
-              <a:t>, b);</a:t>
-            </a:r>
-          </a:p>
-          <a:p>
-            <a:r>
-              <a:rPr lang="en-IE" dirty="0" smtClean="0"/>
-              <a:t>line(a, b+10, </a:t>
-            </a:r>
-            <a:r>
-              <a:rPr lang="en-IE" dirty="0" err="1" smtClean="0"/>
-              <a:t>a+c</a:t>
-            </a:r>
-            <a:r>
-              <a:rPr lang="en-IE" dirty="0" smtClean="0"/>
-              <a:t>, b+10);</a:t>
-            </a:r>
-          </a:p>
-          <a:p>
-            <a:r>
-              <a:rPr lang="en-IE" dirty="0" smtClean="0"/>
-              <a:t>line(a, b+20, </a:t>
-            </a:r>
-            <a:r>
-              <a:rPr lang="en-IE" dirty="0" err="1" smtClean="0"/>
-              <a:t>a+c</a:t>
-            </a:r>
-            <a:r>
-              <a:rPr lang="en-IE" dirty="0" smtClean="0"/>
-              <a:t>, b+20);</a:t>
-            </a:r>
-          </a:p>
-          <a:p>
-            <a:r>
-              <a:rPr lang="en-IE" dirty="0" smtClean="0"/>
-              <a:t>line(a, b+30, </a:t>
-            </a:r>
-            <a:r>
-              <a:rPr lang="en-IE" dirty="0" err="1" smtClean="0"/>
-              <a:t>a+c</a:t>
-            </a:r>
-            <a:r>
-              <a:rPr lang="en-IE" dirty="0" smtClean="0"/>
-              <a:t>, b+30);</a:t>
-            </a:r>
-          </a:p>
-        </p:txBody>
-      </p:sp>
-      <p:sp>
-        <p:nvSpPr>
-          <p:cNvPr id="4" name="Slide Number Placeholder 3"/>
-          <p:cNvSpPr>
-            <a:spLocks noGrp="1"/>
-          </p:cNvSpPr>
-          <p:nvPr>
-            <p:ph type="sldNum" sz="quarter" idx="10"/>
-          </p:nvPr>
-        </p:nvSpPr>
-        <p:spPr/>
-        <p:txBody>
-          <a:bodyPr/>
-          <a:lstStyle/>
-          <a:p>
-            <a:fld id="{F963DB36-5273-45A5-A77C-FE9BE0779D84}" type="slidenum">
-              <a:rPr lang="en-IE" smtClean="0"/>
-              <a:t>17</a:t>
-            </a:fld>
-            <a:endParaRPr lang="en-IE"/>
-          </a:p>
-        </p:txBody>
-      </p:sp>
-    </p:spTree>
-    <p:extLst>
-      <p:ext uri="{BB962C8B-B14F-4D97-AF65-F5344CB8AC3E}">
-        <p14:creationId xmlns:p14="http://schemas.microsoft.com/office/powerpoint/2010/main" val="3513529170"/>
-      </p:ext>
-    </p:extLst>
-  </p:cSld>
-  <p:clrMapOvr>
-    <a:masterClrMapping/>
-  </p:clrMapOvr>
-</p:notes>
-</file>
-
-<file path=ppt/notesSlides/notesSlide2.xml><?xml version="1.0" encoding="utf-8"?>
-<p:notes xmlns:a="http://schemas.openxmlformats.org/drawingml/2006/main" xmlns:r="http://schemas.openxmlformats.org/officeDocument/2006/relationships" xmlns:p="http://schemas.openxmlformats.org/presentationml/2006/main">
-  <p:cSld>
-    <p:spTree>
-      <p:nvGrpSpPr>
-        <p:cNvPr id="1" name=""/>
-        <p:cNvGrpSpPr/>
-        <p:nvPr/>
-      </p:nvGrpSpPr>
-      <p:grpSpPr>
-        <a:xfrm>
-          <a:off x="0" y="0"/>
-          <a:ext cx="0" cy="0"/>
-          <a:chOff x="0" y="0"/>
-          <a:chExt cx="0" cy="0"/>
-        </a:xfrm>
-      </p:grpSpPr>
-      <p:sp>
-        <p:nvSpPr>
-          <p:cNvPr id="2" name="Slide Image Placeholder 1"/>
-          <p:cNvSpPr>
-            <a:spLocks noGrp="1" noRot="1" noChangeAspect="1"/>
-          </p:cNvSpPr>
-          <p:nvPr>
-            <p:ph type="sldImg"/>
-          </p:nvPr>
-        </p:nvSpPr>
-        <p:spPr/>
-      </p:sp>
-      <p:sp>
-        <p:nvSpPr>
-          <p:cNvPr id="3" name="Notes Placeholder 2"/>
-          <p:cNvSpPr>
-            <a:spLocks noGrp="1"/>
-          </p:cNvSpPr>
-          <p:nvPr>
-            <p:ph type="body" idx="1"/>
-          </p:nvPr>
-        </p:nvSpPr>
-        <p:spPr/>
-        <p:txBody>
-          <a:bodyPr/>
-          <a:lstStyle/>
-          <a:p>
-            <a:r>
-              <a:rPr lang="en-IE" dirty="0" smtClean="0"/>
-              <a:t>size(400, 200);</a:t>
-            </a:r>
-          </a:p>
-          <a:p>
-            <a:r>
-              <a:rPr lang="en-IE" dirty="0" smtClean="0"/>
-              <a:t>background(0);</a:t>
-            </a:r>
-          </a:p>
-          <a:p>
-            <a:r>
-              <a:rPr lang="en-IE" dirty="0" smtClean="0"/>
-              <a:t>stroke(153);</a:t>
-            </a:r>
-          </a:p>
-          <a:p>
-            <a:r>
-              <a:rPr lang="en-IE" dirty="0" err="1" smtClean="0"/>
-              <a:t>strokeWeight</a:t>
-            </a:r>
-            <a:r>
-              <a:rPr lang="en-IE" dirty="0" smtClean="0"/>
-              <a:t>(4);</a:t>
-            </a:r>
-          </a:p>
-          <a:p>
-            <a:endParaRPr lang="en-IE" dirty="0" smtClean="0"/>
-          </a:p>
-          <a:p>
-            <a:r>
-              <a:rPr lang="en-IE" dirty="0" err="1" smtClean="0"/>
-              <a:t>int</a:t>
-            </a:r>
-            <a:r>
-              <a:rPr lang="en-IE" dirty="0" smtClean="0"/>
-              <a:t> a = 50;</a:t>
-            </a:r>
-          </a:p>
-          <a:p>
-            <a:r>
-              <a:rPr lang="en-IE" dirty="0" err="1" smtClean="0"/>
-              <a:t>int</a:t>
-            </a:r>
-            <a:r>
-              <a:rPr lang="en-IE" dirty="0" smtClean="0"/>
-              <a:t> b = 1500;</a:t>
-            </a:r>
-          </a:p>
-          <a:p>
-            <a:r>
-              <a:rPr lang="en-IE" dirty="0" err="1" smtClean="0"/>
-              <a:t>int</a:t>
-            </a:r>
-            <a:r>
-              <a:rPr lang="en-IE" dirty="0" smtClean="0"/>
-              <a:t> c = 4;</a:t>
-            </a:r>
-          </a:p>
-          <a:p>
-            <a:endParaRPr lang="en-IE" dirty="0" smtClean="0"/>
-          </a:p>
-          <a:p>
-            <a:r>
-              <a:rPr lang="en-IE" dirty="0" smtClean="0"/>
-              <a:t>line(a, b/10, a*c, b/10);</a:t>
-            </a:r>
-          </a:p>
-          <a:p>
-            <a:r>
-              <a:rPr lang="en-IE" dirty="0" smtClean="0"/>
-              <a:t>line(a, b/20, a*c, b/20);</a:t>
-            </a:r>
-          </a:p>
-          <a:p>
-            <a:r>
-              <a:rPr lang="en-IE" dirty="0" smtClean="0"/>
-              <a:t>line(a, b/30, a*c, b/30);</a:t>
-            </a:r>
-          </a:p>
-          <a:p>
-            <a:r>
-              <a:rPr lang="en-IE" dirty="0" smtClean="0"/>
-              <a:t>line(a, b/40, a*c, b/40);</a:t>
-            </a:r>
-          </a:p>
-          <a:p>
-            <a:r>
-              <a:rPr lang="en-IE" dirty="0" smtClean="0"/>
-              <a:t>line(a, b/50, a*c, b/50);</a:t>
-            </a:r>
-          </a:p>
-        </p:txBody>
-      </p:sp>
-      <p:sp>
-        <p:nvSpPr>
-          <p:cNvPr id="4" name="Slide Number Placeholder 3"/>
-          <p:cNvSpPr>
-            <a:spLocks noGrp="1"/>
-          </p:cNvSpPr>
-          <p:nvPr>
-            <p:ph type="sldNum" sz="quarter" idx="10"/>
-          </p:nvPr>
-        </p:nvSpPr>
-        <p:spPr/>
-        <p:txBody>
-          <a:bodyPr/>
-          <a:lstStyle/>
-          <a:p>
-            <a:fld id="{F963DB36-5273-45A5-A77C-FE9BE0779D84}" type="slidenum">
-              <a:rPr lang="en-IE" smtClean="0"/>
-              <a:t>18</a:t>
-            </a:fld>
-            <a:endParaRPr lang="en-IE"/>
-          </a:p>
-        </p:txBody>
-      </p:sp>
-    </p:spTree>
-    <p:extLst>
-      <p:ext uri="{BB962C8B-B14F-4D97-AF65-F5344CB8AC3E}">
-        <p14:creationId xmlns:p14="http://schemas.microsoft.com/office/powerpoint/2010/main" val="3513529170"/>
-      </p:ext>
-    </p:extLst>
-  </p:cSld>
-  <p:clrMapOvr>
-    <a:masterClrMapping/>
-  </p:clrMapOvr>
-</p:notes>
-</file>
-
-<file path=ppt/notesSlides/notesSlide3.xml><?xml version="1.0" encoding="utf-8"?>
-<p:notes xmlns:a="http://schemas.openxmlformats.org/drawingml/2006/main" xmlns:r="http://schemas.openxmlformats.org/officeDocument/2006/relationships" xmlns:p="http://schemas.openxmlformats.org/presentationml/2006/main">
-  <p:cSld>
-    <p:spTree>
-      <p:nvGrpSpPr>
-        <p:cNvPr id="1" name=""/>
-        <p:cNvGrpSpPr/>
-        <p:nvPr/>
-      </p:nvGrpSpPr>
-      <p:grpSpPr>
-        <a:xfrm>
-          <a:off x="0" y="0"/>
-          <a:ext cx="0" cy="0"/>
-          <a:chOff x="0" y="0"/>
-          <a:chExt cx="0" cy="0"/>
-        </a:xfrm>
-      </p:grpSpPr>
-      <p:sp>
-        <p:nvSpPr>
-          <p:cNvPr id="2" name="Slide Image Placeholder 1"/>
-          <p:cNvSpPr>
-            <a:spLocks noGrp="1" noRot="1" noChangeAspect="1"/>
-          </p:cNvSpPr>
-          <p:nvPr>
-            <p:ph type="sldImg"/>
-          </p:nvPr>
-        </p:nvSpPr>
-        <p:spPr/>
-      </p:sp>
-      <p:sp>
-        <p:nvSpPr>
-          <p:cNvPr id="3" name="Notes Placeholder 2"/>
-          <p:cNvSpPr>
-            <a:spLocks noGrp="1"/>
-          </p:cNvSpPr>
-          <p:nvPr>
-            <p:ph type="body" idx="1"/>
-          </p:nvPr>
-        </p:nvSpPr>
-        <p:spPr/>
-        <p:txBody>
-          <a:bodyPr/>
-          <a:lstStyle/>
-          <a:p>
-            <a:endParaRPr lang="en-IE" dirty="0"/>
-          </a:p>
-        </p:txBody>
-      </p:sp>
-      <p:sp>
-        <p:nvSpPr>
-          <p:cNvPr id="4" name="Slide Number Placeholder 3"/>
-          <p:cNvSpPr>
-            <a:spLocks noGrp="1"/>
-          </p:cNvSpPr>
-          <p:nvPr>
-            <p:ph type="sldNum" sz="quarter" idx="10"/>
-          </p:nvPr>
-        </p:nvSpPr>
-        <p:spPr/>
-        <p:txBody>
-          <a:bodyPr/>
-          <a:lstStyle/>
-          <a:p>
-            <a:fld id="{09E81B23-C832-43C5-9B50-044EE2C12CE3}" type="slidenum">
-              <a:rPr lang="en-IE" smtClean="0"/>
-              <a:t>23</a:t>
-            </a:fld>
-            <a:endParaRPr lang="en-IE"/>
-          </a:p>
-        </p:txBody>
-      </p:sp>
-    </p:spTree>
-    <p:extLst>
-      <p:ext uri="{BB962C8B-B14F-4D97-AF65-F5344CB8AC3E}">
-        <p14:creationId xmlns:p14="http://schemas.microsoft.com/office/powerpoint/2010/main" val="2189985884"/>
-      </p:ext>
-    </p:extLst>
-  </p:cSld>
-  <p:clrMapOvr>
-    <a:masterClrMapping/>
-  </p:clrMapOvr>
-</p:notes>
-</file>
-
-<file path=ppt/notesSlides/notesSlide4.xml><?xml version="1.0" encoding="utf-8"?>
-<p:notes xmlns:a="http://schemas.openxmlformats.org/drawingml/2006/main" xmlns:r="http://schemas.openxmlformats.org/officeDocument/2006/relationships" xmlns:p="http://schemas.openxmlformats.org/presentationml/2006/main">
-  <p:cSld>
-    <p:spTree>
-      <p:nvGrpSpPr>
-        <p:cNvPr id="1" name=""/>
-        <p:cNvGrpSpPr/>
-        <p:nvPr/>
-      </p:nvGrpSpPr>
-      <p:grpSpPr>
-        <a:xfrm>
-          <a:off x="0" y="0"/>
-          <a:ext cx="0" cy="0"/>
-          <a:chOff x="0" y="0"/>
-          <a:chExt cx="0" cy="0"/>
-        </a:xfrm>
-      </p:grpSpPr>
-      <p:sp>
-        <p:nvSpPr>
-          <p:cNvPr id="2" name="Slide Image Placeholder 1"/>
-          <p:cNvSpPr>
-            <a:spLocks noGrp="1" noRot="1" noChangeAspect="1"/>
-          </p:cNvSpPr>
-          <p:nvPr>
-            <p:ph type="sldImg"/>
-          </p:nvPr>
-        </p:nvSpPr>
-        <p:spPr/>
-      </p:sp>
-      <p:sp>
-        <p:nvSpPr>
-          <p:cNvPr id="3" name="Notes Placeholder 2"/>
-          <p:cNvSpPr>
-            <a:spLocks noGrp="1"/>
-          </p:cNvSpPr>
-          <p:nvPr>
-            <p:ph type="body" idx="1"/>
-          </p:nvPr>
-        </p:nvSpPr>
-        <p:spPr/>
-        <p:txBody>
-          <a:bodyPr/>
-          <a:lstStyle/>
-          <a:p>
-            <a:r>
-              <a:rPr lang="en-IE" dirty="0" smtClean="0"/>
-              <a:t>A1:  31</a:t>
-            </a:r>
-          </a:p>
-          <a:p>
-            <a:r>
-              <a:rPr lang="en-IE" dirty="0" smtClean="0"/>
-              <a:t>A2:  21</a:t>
-            </a:r>
-          </a:p>
-          <a:p>
-            <a:r>
-              <a:rPr lang="en-IE" dirty="0" smtClean="0"/>
-              <a:t>A3:  43</a:t>
-            </a:r>
-          </a:p>
-          <a:p>
-            <a:endParaRPr lang="en-IE" dirty="0"/>
-          </a:p>
-        </p:txBody>
-      </p:sp>
-      <p:sp>
-        <p:nvSpPr>
-          <p:cNvPr id="4" name="Slide Number Placeholder 3"/>
-          <p:cNvSpPr>
-            <a:spLocks noGrp="1"/>
-          </p:cNvSpPr>
-          <p:nvPr>
-            <p:ph type="sldNum" sz="quarter" idx="10"/>
-          </p:nvPr>
-        </p:nvSpPr>
-        <p:spPr/>
-        <p:txBody>
-          <a:bodyPr/>
-          <a:lstStyle/>
-          <a:p>
-            <a:fld id="{09E81B23-C832-43C5-9B50-044EE2C12CE3}" type="slidenum">
-              <a:rPr lang="en-IE" smtClean="0"/>
-              <a:t>24</a:t>
-            </a:fld>
-            <a:endParaRPr lang="en-IE"/>
-          </a:p>
-        </p:txBody>
-      </p:sp>
-    </p:spTree>
-    <p:extLst>
-      <p:ext uri="{BB962C8B-B14F-4D97-AF65-F5344CB8AC3E}">
-        <p14:creationId xmlns:p14="http://schemas.microsoft.com/office/powerpoint/2010/main" val="2189985884"/>
-      </p:ext>
-    </p:extLst>
-  </p:cSld>
-  <p:clrMapOvr>
-    <a:masterClrMapping/>
-  </p:clrMapOvr>
-</p:notes>
-</file>
-
 <file path=ppt/slideLayouts/slideLayout1.xml><?xml version="1.0" encoding="utf-8"?>
 <p:sldLayout xmlns:a="http://schemas.openxmlformats.org/drawingml/2006/main" xmlns:r="http://schemas.openxmlformats.org/officeDocument/2006/relationships" xmlns:p="http://schemas.openxmlformats.org/presentationml/2006/main" type="title" preserve="1">
   <p:cSld name="Title Slide">
@@ -1230,7 +657,7 @@
             <a:fld id="{1D8BD707-D9CF-40AE-B4C6-C98DA3205C09}" type="datetimeFigureOut">
               <a:rPr lang="en-US" smtClean="0"/>
               <a:pPr/>
-              <a:t>1/14/2016</a:t>
+              <a:t>1/18/2016</a:t>
             </a:fld>
             <a:endParaRPr lang="en-US"/>
           </a:p>
@@ -1404,7 +831,7 @@
             <a:fld id="{1D8BD707-D9CF-40AE-B4C6-C98DA3205C09}" type="datetimeFigureOut">
               <a:rPr lang="en-US" smtClean="0"/>
               <a:pPr/>
-              <a:t>1/14/2016</a:t>
+              <a:t>1/18/2016</a:t>
             </a:fld>
             <a:endParaRPr lang="en-US"/>
           </a:p>
@@ -1588,7 +1015,7 @@
             <a:fld id="{1D8BD707-D9CF-40AE-B4C6-C98DA3205C09}" type="datetimeFigureOut">
               <a:rPr lang="en-US" smtClean="0"/>
               <a:pPr/>
-              <a:t>1/14/2016</a:t>
+              <a:t>1/18/2016</a:t>
             </a:fld>
             <a:endParaRPr lang="en-US"/>
           </a:p>
@@ -1773,7 +1200,7 @@
             <a:fld id="{1D8BD707-D9CF-40AE-B4C6-C98DA3205C09}" type="datetimeFigureOut">
               <a:rPr lang="en-US" smtClean="0"/>
               <a:pPr/>
-              <a:t>1/14/2016</a:t>
+              <a:t>1/18/2016</a:t>
             </a:fld>
             <a:endParaRPr lang="en-US"/>
           </a:p>
@@ -2061,7 +1488,7 @@
             <a:fld id="{1D8BD707-D9CF-40AE-B4C6-C98DA3205C09}" type="datetimeFigureOut">
               <a:rPr lang="en-US" smtClean="0"/>
               <a:pPr/>
-              <a:t>1/14/2016</a:t>
+              <a:t>1/18/2016</a:t>
             </a:fld>
             <a:endParaRPr lang="en-US"/>
           </a:p>
@@ -2364,7 +1791,7 @@
             <a:fld id="{1D8BD707-D9CF-40AE-B4C6-C98DA3205C09}" type="datetimeFigureOut">
               <a:rPr lang="en-US" smtClean="0"/>
               <a:pPr/>
-              <a:t>1/14/2016</a:t>
+              <a:t>1/18/2016</a:t>
             </a:fld>
             <a:endParaRPr lang="en-US"/>
           </a:p>
@@ -2832,7 +2259,7 @@
             <a:fld id="{1D8BD707-D9CF-40AE-B4C6-C98DA3205C09}" type="datetimeFigureOut">
               <a:rPr lang="en-US" smtClean="0"/>
               <a:pPr/>
-              <a:t>1/14/2016</a:t>
+              <a:t>1/18/2016</a:t>
             </a:fld>
             <a:endParaRPr lang="en-US"/>
           </a:p>
@@ -3000,7 +2427,7 @@
             <a:fld id="{1D8BD707-D9CF-40AE-B4C6-C98DA3205C09}" type="datetimeFigureOut">
               <a:rPr lang="en-US" smtClean="0"/>
               <a:pPr/>
-              <a:t>1/14/2016</a:t>
+              <a:t>1/18/2016</a:t>
             </a:fld>
             <a:endParaRPr lang="en-US"/>
           </a:p>
@@ -3134,7 +2561,7 @@
             <a:fld id="{1D8BD707-D9CF-40AE-B4C6-C98DA3205C09}" type="datetimeFigureOut">
               <a:rPr lang="en-US" smtClean="0"/>
               <a:pPr/>
-              <a:t>1/14/2016</a:t>
+              <a:t>1/18/2016</a:t>
             </a:fld>
             <a:endParaRPr lang="en-US"/>
           </a:p>
@@ -3415,7 +2842,7 @@
             <a:fld id="{1D8BD707-D9CF-40AE-B4C6-C98DA3205C09}" type="datetimeFigureOut">
               <a:rPr lang="en-US" smtClean="0"/>
               <a:pPr/>
-              <a:t>1/14/2016</a:t>
+              <a:t>1/18/2016</a:t>
             </a:fld>
             <a:endParaRPr lang="en-US"/>
           </a:p>
@@ -3672,7 +3099,7 @@
             <a:fld id="{1D8BD707-D9CF-40AE-B4C6-C98DA3205C09}" type="datetimeFigureOut">
               <a:rPr lang="en-US" smtClean="0"/>
               <a:pPr/>
-              <a:t>1/14/2016</a:t>
+              <a:t>1/18/2016</a:t>
             </a:fld>
             <a:endParaRPr lang="en-US"/>
           </a:p>
@@ -3889,7 +3316,7 @@
             <a:fld id="{1D8BD707-D9CF-40AE-B4C6-C98DA3205C09}" type="datetimeFigureOut">
               <a:rPr lang="en-US" smtClean="0"/>
               <a:pPr/>
-              <a:t>1/14/2016</a:t>
+              <a:t>1/18/2016</a:t>
             </a:fld>
             <a:endParaRPr lang="en-US"/>
           </a:p>
@@ -4444,29 +3871,7 @@
                   </a:schemeClr>
                 </a:solidFill>
               </a:rPr>
-              <a:t>Events </a:t>
-            </a:r>
-            <a:r>
-              <a:rPr lang="en-IE" sz="3200" dirty="0">
-                <a:solidFill>
-                  <a:schemeClr val="tx1">
-                    <a:lumMod val="50000"/>
-                    <a:lumOff val="50000"/>
-                  </a:schemeClr>
-                </a:solidFill>
-              </a:rPr>
-              <a:t>and </a:t>
-            </a:r>
-            <a:r>
-              <a:rPr lang="en-IE" sz="3200" dirty="0" smtClean="0">
-                <a:solidFill>
-                  <a:schemeClr val="tx1">
-                    <a:lumMod val="50000"/>
-                    <a:lumOff val="50000"/>
-                  </a:schemeClr>
-                </a:solidFill>
-              </a:rPr>
-              <a:t>Arithmetic Operators</a:t>
+              <a:t>Events</a:t>
             </a:r>
             <a:endParaRPr lang="en-IE" sz="3200" dirty="0">
               <a:solidFill>
@@ -4657,325 +4062,6 @@
 </file>
 
 <file path=ppt/slides/slide10.xml><?xml version="1.0" encoding="utf-8"?>
-<p:sld xmlns:a="http://schemas.openxmlformats.org/drawingml/2006/main" xmlns:r="http://schemas.openxmlformats.org/officeDocument/2006/relationships" xmlns:p="http://schemas.openxmlformats.org/presentationml/2006/main">
-  <p:cSld>
-    <p:spTree>
-      <p:nvGrpSpPr>
-        <p:cNvPr id="1" name=""/>
-        <p:cNvGrpSpPr/>
-        <p:nvPr/>
-      </p:nvGrpSpPr>
-      <p:grpSpPr>
-        <a:xfrm>
-          <a:off x="0" y="0"/>
-          <a:ext cx="0" cy="0"/>
-          <a:chOff x="0" y="0"/>
-          <a:chExt cx="0" cy="0"/>
-        </a:xfrm>
-      </p:grpSpPr>
-      <p:sp>
-        <p:nvSpPr>
-          <p:cNvPr id="2" name="Title 1"/>
-          <p:cNvSpPr>
-            <a:spLocks noGrp="1"/>
-          </p:cNvSpPr>
-          <p:nvPr>
-            <p:ph type="title"/>
-          </p:nvPr>
-        </p:nvSpPr>
-        <p:spPr/>
-        <p:txBody>
-          <a:bodyPr>
-            <a:normAutofit/>
-          </a:bodyPr>
-          <a:lstStyle/>
-          <a:p>
-            <a:r>
-              <a:rPr lang="en-IE" dirty="0" smtClean="0"/>
-              <a:t>Processing Example 5.3</a:t>
-            </a:r>
-            <a:endParaRPr lang="en-IE" dirty="0"/>
-          </a:p>
-        </p:txBody>
-      </p:sp>
-      <p:sp>
-        <p:nvSpPr>
-          <p:cNvPr id="3" name="Content Placeholder 2"/>
-          <p:cNvSpPr>
-            <a:spLocks noGrp="1"/>
-          </p:cNvSpPr>
-          <p:nvPr>
-            <p:ph idx="1"/>
-          </p:nvPr>
-        </p:nvSpPr>
-        <p:spPr>
-          <a:xfrm>
-            <a:off x="457199" y="1600200"/>
-            <a:ext cx="6606493" cy="4525963"/>
-          </a:xfrm>
-        </p:spPr>
-        <p:txBody>
-          <a:bodyPr>
-            <a:normAutofit fontScale="85000" lnSpcReduction="20000"/>
-          </a:bodyPr>
-          <a:lstStyle/>
-          <a:p>
-            <a:r>
-              <a:rPr lang="en-IE" dirty="0" smtClean="0"/>
-              <a:t>Functionality:</a:t>
-            </a:r>
-          </a:p>
-          <a:p>
-            <a:pPr marL="0" indent="0">
-              <a:buNone/>
-            </a:pPr>
-            <a:endParaRPr lang="en-IE" sz="1500" dirty="0" smtClean="0"/>
-          </a:p>
-          <a:p>
-            <a:pPr lvl="1"/>
-            <a:r>
-              <a:rPr lang="en-IE" dirty="0" smtClean="0"/>
-              <a:t>If the LEFT button on the mouse is pressed, set the fill to black and draw a square.  As soon as the LEFT button is released, </a:t>
-            </a:r>
-            <a:r>
-              <a:rPr lang="en-IE" dirty="0" err="1" smtClean="0"/>
-              <a:t>gray</a:t>
-            </a:r>
-            <a:r>
-              <a:rPr lang="en-IE" dirty="0" smtClean="0"/>
-              <a:t> fill the square.</a:t>
-            </a:r>
-          </a:p>
-          <a:p>
-            <a:pPr marL="457200" lvl="1" indent="0">
-              <a:buNone/>
-            </a:pPr>
-            <a:endParaRPr lang="en-IE" dirty="0" smtClean="0"/>
-          </a:p>
-          <a:p>
-            <a:pPr lvl="1"/>
-            <a:r>
-              <a:rPr lang="en-IE" dirty="0"/>
-              <a:t>If the </a:t>
-            </a:r>
-            <a:r>
-              <a:rPr lang="en-IE" dirty="0" smtClean="0"/>
-              <a:t>RIGHT button </a:t>
-            </a:r>
-            <a:r>
-              <a:rPr lang="en-IE" dirty="0"/>
-              <a:t>on the mouse is pressed, set the fill to </a:t>
-            </a:r>
-            <a:r>
-              <a:rPr lang="en-IE" dirty="0" smtClean="0"/>
-              <a:t>white and </a:t>
-            </a:r>
-            <a:r>
-              <a:rPr lang="en-IE" dirty="0"/>
-              <a:t>draw a square</a:t>
-            </a:r>
-            <a:r>
-              <a:rPr lang="en-IE" dirty="0" smtClean="0"/>
-              <a:t>. </a:t>
-            </a:r>
-            <a:r>
-              <a:rPr lang="en-IE" dirty="0"/>
-              <a:t>As soon as the  </a:t>
-            </a:r>
-            <a:r>
-              <a:rPr lang="en-IE" dirty="0" smtClean="0"/>
-              <a:t>RIGHT button </a:t>
-            </a:r>
-            <a:r>
-              <a:rPr lang="en-IE" dirty="0"/>
-              <a:t>is released, </a:t>
-            </a:r>
-            <a:r>
-              <a:rPr lang="en-IE" dirty="0" err="1"/>
-              <a:t>gray</a:t>
-            </a:r>
-            <a:r>
-              <a:rPr lang="en-IE" dirty="0"/>
-              <a:t> fill the square.</a:t>
-            </a:r>
-            <a:endParaRPr lang="en-IE" dirty="0" smtClean="0"/>
-          </a:p>
-          <a:p>
-            <a:pPr lvl="1"/>
-            <a:endParaRPr lang="en-IE" dirty="0" smtClean="0"/>
-          </a:p>
-          <a:p>
-            <a:pPr lvl="1"/>
-            <a:r>
-              <a:rPr lang="en-IE" dirty="0" smtClean="0"/>
-              <a:t>If no mouse button is pressed, set the fill to </a:t>
-            </a:r>
-            <a:r>
-              <a:rPr lang="en-IE" dirty="0" err="1" smtClean="0"/>
-              <a:t>gray</a:t>
-            </a:r>
-            <a:r>
-              <a:rPr lang="en-IE" dirty="0" smtClean="0"/>
-              <a:t> and draw a square.</a:t>
-            </a:r>
-          </a:p>
-        </p:txBody>
-      </p:sp>
-      <p:pic>
-        <p:nvPicPr>
-          <p:cNvPr id="6" name="Picture 2"/>
-          <p:cNvPicPr>
-            <a:picLocks noChangeAspect="1" noChangeArrowheads="1"/>
-          </p:cNvPicPr>
-          <p:nvPr/>
-        </p:nvPicPr>
-        <p:blipFill rotWithShape="1">
-          <a:blip r:embed="rId2">
-            <a:extLst>
-              <a:ext uri="{28A0092B-C50C-407E-A947-70E740481C1C}">
-                <a14:useLocalDpi xmlns:a14="http://schemas.microsoft.com/office/drawing/2010/main" val="0"/>
-              </a:ext>
-            </a:extLst>
-          </a:blip>
-          <a:srcRect l="20140" t="10448" r="69371" b="68879"/>
-          <a:stretch/>
-        </p:blipFill>
-        <p:spPr bwMode="auto">
-          <a:xfrm>
-            <a:off x="7368493" y="2031242"/>
-            <a:ext cx="1089707" cy="1207490"/>
-          </a:xfrm>
-          <a:prstGeom prst="rect">
-            <a:avLst/>
-          </a:prstGeom>
-          <a:noFill/>
-          <a:ln w="9525">
-            <a:solidFill>
-              <a:schemeClr val="tx1"/>
-            </a:solidFill>
-            <a:miter lim="800000"/>
-            <a:headEnd/>
-            <a:tailEnd/>
-          </a:ln>
-          <a:extLst>
-            <a:ext uri="{909E8E84-426E-40DD-AFC4-6F175D3DCCD1}">
-              <a14:hiddenFill xmlns:a14="http://schemas.microsoft.com/office/drawing/2010/main">
-                <a:solidFill>
-                  <a:schemeClr val="accent1"/>
-                </a:solidFill>
-              </a14:hiddenFill>
-            </a:ext>
-          </a:extLst>
-        </p:spPr>
-      </p:pic>
-      <p:pic>
-        <p:nvPicPr>
-          <p:cNvPr id="7" name="Picture 3"/>
-          <p:cNvPicPr>
-            <a:picLocks noChangeAspect="1" noChangeArrowheads="1"/>
-          </p:cNvPicPr>
-          <p:nvPr/>
-        </p:nvPicPr>
-        <p:blipFill rotWithShape="1">
-          <a:blip r:embed="rId3">
-            <a:extLst>
-              <a:ext uri="{28A0092B-C50C-407E-A947-70E740481C1C}">
-                <a14:useLocalDpi xmlns:a14="http://schemas.microsoft.com/office/drawing/2010/main" val="0"/>
-              </a:ext>
-            </a:extLst>
-          </a:blip>
-          <a:srcRect l="20001" t="10028" r="69300" b="68144"/>
-          <a:stretch/>
-        </p:blipFill>
-        <p:spPr bwMode="auto">
-          <a:xfrm>
-            <a:off x="7331850" y="3599597"/>
-            <a:ext cx="1126350" cy="1291989"/>
-          </a:xfrm>
-          <a:prstGeom prst="rect">
-            <a:avLst/>
-          </a:prstGeom>
-          <a:noFill/>
-          <a:ln w="9525">
-            <a:solidFill>
-              <a:schemeClr val="tx1"/>
-            </a:solidFill>
-            <a:miter lim="800000"/>
-            <a:headEnd/>
-            <a:tailEnd/>
-          </a:ln>
-          <a:extLst>
-            <a:ext uri="{909E8E84-426E-40DD-AFC4-6F175D3DCCD1}">
-              <a14:hiddenFill xmlns:a14="http://schemas.microsoft.com/office/drawing/2010/main">
-                <a:solidFill>
-                  <a:schemeClr val="accent1"/>
-                </a:solidFill>
-              </a14:hiddenFill>
-            </a:ext>
-          </a:extLst>
-        </p:spPr>
-      </p:pic>
-      <p:pic>
-        <p:nvPicPr>
-          <p:cNvPr id="8" name="Picture 2"/>
-          <p:cNvPicPr>
-            <a:picLocks noChangeAspect="1" noChangeArrowheads="1"/>
-          </p:cNvPicPr>
-          <p:nvPr/>
-        </p:nvPicPr>
-        <p:blipFill rotWithShape="1">
-          <a:blip r:embed="rId4">
-            <a:extLst>
-              <a:ext uri="{28A0092B-C50C-407E-A947-70E740481C1C}">
-                <a14:useLocalDpi xmlns:a14="http://schemas.microsoft.com/office/drawing/2010/main" val="0"/>
-              </a:ext>
-            </a:extLst>
-          </a:blip>
-          <a:srcRect l="20244" t="10448" r="69476" b="68879"/>
-          <a:stretch/>
-        </p:blipFill>
-        <p:spPr bwMode="auto">
-          <a:xfrm>
-            <a:off x="7349319" y="5181600"/>
-            <a:ext cx="1108881" cy="1253812"/>
-          </a:xfrm>
-          <a:prstGeom prst="rect">
-            <a:avLst/>
-          </a:prstGeom>
-          <a:noFill/>
-          <a:ln w="9525">
-            <a:solidFill>
-              <a:schemeClr val="tx1"/>
-            </a:solidFill>
-            <a:miter lim="800000"/>
-            <a:headEnd/>
-            <a:tailEnd/>
-          </a:ln>
-          <a:extLst>
-            <a:ext uri="{909E8E84-426E-40DD-AFC4-6F175D3DCCD1}">
-              <a14:hiddenFill xmlns:a14="http://schemas.microsoft.com/office/drawing/2010/main">
-                <a:solidFill>
-                  <a:schemeClr val="accent1"/>
-                </a:solidFill>
-              </a14:hiddenFill>
-            </a:ext>
-          </a:extLst>
-        </p:spPr>
-      </p:pic>
-    </p:spTree>
-    <p:extLst>
-      <p:ext uri="{BB962C8B-B14F-4D97-AF65-F5344CB8AC3E}">
-        <p14:creationId xmlns:p14="http://schemas.microsoft.com/office/powerpoint/2010/main" val="1832883794"/>
-      </p:ext>
-    </p:extLst>
-  </p:cSld>
-  <p:clrMapOvr>
-    <a:masterClrMapping/>
-  </p:clrMapOvr>
-</p:sld>
-</file>
-
-<file path=ppt/slides/slide11.xml><?xml version="1.0" encoding="utf-8"?>
 <p:sld xmlns:a="http://schemas.openxmlformats.org/drawingml/2006/main" xmlns:r="http://schemas.openxmlformats.org/officeDocument/2006/relationships" xmlns:p="http://schemas.openxmlformats.org/presentationml/2006/main">
   <p:cSld>
     <p:spTree>
@@ -5564,7 +4650,7 @@
 </p:sld>
 </file>
 
-<file path=ppt/slides/slide12.xml><?xml version="1.0" encoding="utf-8"?>
+<file path=ppt/slides/slide11.xml><?xml version="1.0" encoding="utf-8"?>
 <p:sld xmlns:a="http://schemas.openxmlformats.org/drawingml/2006/main" xmlns:r="http://schemas.openxmlformats.org/officeDocument/2006/relationships" xmlns:p="http://schemas.openxmlformats.org/presentationml/2006/main">
   <p:cSld>
     <p:spTree>
@@ -5787,7 +4873,7 @@
 </p:sld>
 </file>
 
-<file path=ppt/slides/slide13.xml><?xml version="1.0" encoding="utf-8"?>
+<file path=ppt/slides/slide12.xml><?xml version="1.0" encoding="utf-8"?>
 <p:sld xmlns:a="http://schemas.openxmlformats.org/drawingml/2006/main" xmlns:r="http://schemas.openxmlformats.org/officeDocument/2006/relationships" xmlns:p="http://schemas.openxmlformats.org/presentationml/2006/main">
   <p:cSld>
     <p:spTree>
@@ -6224,7 +5310,7 @@
 </p:sld>
 </file>
 
-<file path=ppt/slides/slide14.xml><?xml version="1.0" encoding="utf-8"?>
+<file path=ppt/slides/slide13.xml><?xml version="1.0" encoding="utf-8"?>
 <p:sld xmlns:a="http://schemas.openxmlformats.org/drawingml/2006/main" xmlns:r="http://schemas.openxmlformats.org/officeDocument/2006/relationships" xmlns:p="http://schemas.openxmlformats.org/presentationml/2006/main">
   <p:cSld>
     <p:spTree>
@@ -6763,2601 +5849,7 @@
 </p:sld>
 </file>
 
-<file path=ppt/slides/slide15.xml><?xml version="1.0" encoding="utf-8"?>
-<p:sld xmlns:a="http://schemas.openxmlformats.org/drawingml/2006/main" xmlns:r="http://schemas.openxmlformats.org/officeDocument/2006/relationships" xmlns:p="http://schemas.openxmlformats.org/presentationml/2006/main">
-  <p:cSld>
-    <p:spTree>
-      <p:nvGrpSpPr>
-        <p:cNvPr id="1" name=""/>
-        <p:cNvGrpSpPr/>
-        <p:nvPr/>
-      </p:nvGrpSpPr>
-      <p:grpSpPr>
-        <a:xfrm>
-          <a:off x="0" y="0"/>
-          <a:ext cx="0" cy="0"/>
-          <a:chOff x="0" y="0"/>
-          <a:chExt cx="0" cy="0"/>
-        </a:xfrm>
-      </p:grpSpPr>
-      <p:sp>
-        <p:nvSpPr>
-          <p:cNvPr id="2" name="Title 1"/>
-          <p:cNvSpPr>
-            <a:spLocks noGrp="1"/>
-          </p:cNvSpPr>
-          <p:nvPr>
-            <p:ph type="title"/>
-          </p:nvPr>
-        </p:nvSpPr>
-        <p:spPr/>
-        <p:txBody>
-          <a:bodyPr/>
-          <a:lstStyle/>
-          <a:p>
-            <a:r>
-              <a:rPr lang="en-IE" smtClean="0"/>
-              <a:t>Topics list</a:t>
-            </a:r>
-            <a:endParaRPr lang="en-IE" dirty="0"/>
-          </a:p>
-        </p:txBody>
-      </p:sp>
-      <p:sp>
-        <p:nvSpPr>
-          <p:cNvPr id="5" name="Content Placeholder 4"/>
-          <p:cNvSpPr>
-            <a:spLocks noGrp="1"/>
-          </p:cNvSpPr>
-          <p:nvPr>
-            <p:ph idx="1"/>
-          </p:nvPr>
-        </p:nvSpPr>
-        <p:spPr>
-          <a:xfrm>
-            <a:off x="457200" y="1600200"/>
-            <a:ext cx="8229600" cy="4525963"/>
-          </a:xfrm>
-        </p:spPr>
-        <p:txBody>
-          <a:bodyPr>
-            <a:normAutofit/>
-          </a:bodyPr>
-          <a:lstStyle/>
-          <a:p>
-            <a:pPr marL="0" indent="0">
-              <a:buNone/>
-            </a:pPr>
-            <a:endParaRPr lang="en-IE" dirty="0" smtClean="0"/>
-          </a:p>
-          <a:p>
-            <a:r>
-              <a:rPr lang="en-IE" dirty="0" smtClean="0"/>
-              <a:t>Mouse Events</a:t>
-            </a:r>
-          </a:p>
-          <a:p>
-            <a:endParaRPr lang="en-IE" dirty="0"/>
-          </a:p>
-          <a:p>
-            <a:r>
-              <a:rPr lang="en-IE" dirty="0" smtClean="0"/>
-              <a:t>Recap: Arithmetic Operators</a:t>
-            </a:r>
-          </a:p>
-          <a:p>
-            <a:endParaRPr lang="en-IE" dirty="0"/>
-          </a:p>
-          <a:p>
-            <a:r>
-              <a:rPr lang="en-IE" dirty="0" smtClean="0"/>
-              <a:t>Order of Evaluation</a:t>
-            </a:r>
-          </a:p>
-        </p:txBody>
-      </p:sp>
-      <p:sp>
-        <p:nvSpPr>
-          <p:cNvPr id="4" name="Rectangle 3"/>
-          <p:cNvSpPr/>
-          <p:nvPr/>
-        </p:nvSpPr>
-        <p:spPr>
-          <a:xfrm>
-            <a:off x="838200" y="3429000"/>
-            <a:ext cx="6096000" cy="533400"/>
-          </a:xfrm>
-          <a:prstGeom prst="rect">
-            <a:avLst/>
-          </a:prstGeom>
-          <a:noFill/>
-          <a:ln>
-            <a:solidFill>
-              <a:srgbClr val="FF0000"/>
-            </a:solidFill>
-          </a:ln>
-        </p:spPr>
-        <p:style>
-          <a:lnRef idx="2">
-            <a:schemeClr val="accent1">
-              <a:shade val="50000"/>
-            </a:schemeClr>
-          </a:lnRef>
-          <a:fillRef idx="1">
-            <a:schemeClr val="accent1"/>
-          </a:fillRef>
-          <a:effectRef idx="0">
-            <a:schemeClr val="accent1"/>
-          </a:effectRef>
-          <a:fontRef idx="minor">
-            <a:schemeClr val="lt1"/>
-          </a:fontRef>
-        </p:style>
-        <p:txBody>
-          <a:bodyPr rtlCol="0" anchor="ctr"/>
-          <a:lstStyle/>
-          <a:p>
-            <a:pPr algn="ctr"/>
-            <a:endParaRPr lang="en-IE"/>
-          </a:p>
-        </p:txBody>
-      </p:sp>
-    </p:spTree>
-    <p:extLst>
-      <p:ext uri="{BB962C8B-B14F-4D97-AF65-F5344CB8AC3E}">
-        <p14:creationId xmlns:p14="http://schemas.microsoft.com/office/powerpoint/2010/main" val="145953641"/>
-      </p:ext>
-    </p:extLst>
-  </p:cSld>
-  <p:clrMapOvr>
-    <a:masterClrMapping/>
-  </p:clrMapOvr>
-  <p:timing>
-    <p:tnLst>
-      <p:par>
-        <p:cTn id="1" dur="indefinite" restart="never" nodeType="tmRoot"/>
-      </p:par>
-    </p:tnLst>
-  </p:timing>
-</p:sld>
-</file>
-
-<file path=ppt/slides/slide16.xml><?xml version="1.0" encoding="utf-8"?>
-<p:sld xmlns:a="http://schemas.openxmlformats.org/drawingml/2006/main" xmlns:r="http://schemas.openxmlformats.org/officeDocument/2006/relationships" xmlns:p="http://schemas.openxmlformats.org/presentationml/2006/main">
-  <p:cSld>
-    <p:spTree>
-      <p:nvGrpSpPr>
-        <p:cNvPr id="1" name=""/>
-        <p:cNvGrpSpPr/>
-        <p:nvPr/>
-      </p:nvGrpSpPr>
-      <p:grpSpPr>
-        <a:xfrm>
-          <a:off x="0" y="0"/>
-          <a:ext cx="0" cy="0"/>
-          <a:chOff x="0" y="0"/>
-          <a:chExt cx="0" cy="0"/>
-        </a:xfrm>
-      </p:grpSpPr>
-      <p:sp>
-        <p:nvSpPr>
-          <p:cNvPr id="2" name="Title 1"/>
-          <p:cNvSpPr>
-            <a:spLocks noGrp="1"/>
-          </p:cNvSpPr>
-          <p:nvPr>
-            <p:ph type="title"/>
-          </p:nvPr>
-        </p:nvSpPr>
-        <p:spPr/>
-        <p:txBody>
-          <a:bodyPr/>
-          <a:lstStyle/>
-          <a:p>
-            <a:r>
-              <a:rPr lang="en-IE" dirty="0" smtClean="0"/>
-              <a:t>Recap: Arithmetic Operators </a:t>
-            </a:r>
-            <a:endParaRPr lang="en-IE" dirty="0"/>
-          </a:p>
-        </p:txBody>
-      </p:sp>
-      <p:graphicFrame>
-        <p:nvGraphicFramePr>
-          <p:cNvPr id="4" name="Content Placeholder 3"/>
-          <p:cNvGraphicFramePr>
-            <a:graphicFrameLocks noGrp="1"/>
-          </p:cNvGraphicFramePr>
-          <p:nvPr>
-            <p:ph idx="1"/>
-            <p:extLst>
-              <p:ext uri="{D42A27DB-BD31-4B8C-83A1-F6EECF244321}">
-                <p14:modId xmlns:p14="http://schemas.microsoft.com/office/powerpoint/2010/main" val="2061352024"/>
-              </p:ext>
-            </p:extLst>
-          </p:nvPr>
-        </p:nvGraphicFramePr>
-        <p:xfrm>
-          <a:off x="457200" y="1758944"/>
-          <a:ext cx="8382000" cy="4724400"/>
-        </p:xfrm>
-        <a:graphic>
-          <a:graphicData uri="http://schemas.openxmlformats.org/drawingml/2006/table">
-            <a:tbl>
-              <a:tblPr firstRow="1" bandRow="1">
-                <a:tableStyleId>{5C22544A-7EE6-4342-B048-85BDC9FD1C3A}</a:tableStyleId>
-              </a:tblPr>
-              <a:tblGrid>
-                <a:gridCol w="1828800"/>
-                <a:gridCol w="2667000"/>
-                <a:gridCol w="3886200"/>
-              </a:tblGrid>
-              <a:tr h="685800">
-                <a:tc>
-                  <a:txBody>
-                    <a:bodyPr/>
-                    <a:lstStyle/>
-                    <a:p>
-                      <a:r>
-                        <a:rPr lang="en-IE" sz="2800" dirty="0" smtClean="0"/>
-                        <a:t>Arithmetic</a:t>
-                      </a:r>
-                      <a:r>
-                        <a:rPr lang="en-IE" sz="2800" baseline="0" dirty="0" smtClean="0"/>
-                        <a:t> Operator</a:t>
-                      </a:r>
-                      <a:endParaRPr lang="en-IE" sz="2800" dirty="0"/>
-                    </a:p>
-                  </a:txBody>
-                  <a:tcPr>
-                    <a:lnL w="12700" cap="flat" cmpd="sng" algn="ctr">
-                      <a:solidFill>
-                        <a:schemeClr val="tx1"/>
-                      </a:solidFill>
-                      <a:prstDash val="solid"/>
-                      <a:round/>
-                      <a:headEnd type="none" w="med" len="med"/>
-                      <a:tailEnd type="none" w="med" len="med"/>
-                    </a:lnL>
-                    <a:lnR w="12700" cap="flat" cmpd="sng" algn="ctr">
-                      <a:solidFill>
-                        <a:schemeClr val="tx1"/>
-                      </a:solidFill>
-                      <a:prstDash val="solid"/>
-                      <a:round/>
-                      <a:headEnd type="none" w="med" len="med"/>
-                      <a:tailEnd type="none" w="med" len="med"/>
-                    </a:lnR>
-                    <a:lnT w="12700" cap="flat" cmpd="sng" algn="ctr">
-                      <a:solidFill>
-                        <a:schemeClr val="tx1"/>
-                      </a:solidFill>
-                      <a:prstDash val="solid"/>
-                      <a:round/>
-                      <a:headEnd type="none" w="med" len="med"/>
-                      <a:tailEnd type="none" w="med" len="med"/>
-                    </a:lnT>
-                    <a:lnB w="12700" cap="flat" cmpd="sng" algn="ctr">
-                      <a:solidFill>
-                        <a:schemeClr val="tx1"/>
-                      </a:solidFill>
-                      <a:prstDash val="solid"/>
-                      <a:round/>
-                      <a:headEnd type="none" w="med" len="med"/>
-                      <a:tailEnd type="none" w="med" len="med"/>
-                    </a:lnB>
-                  </a:tcPr>
-                </a:tc>
-                <a:tc>
-                  <a:txBody>
-                    <a:bodyPr/>
-                    <a:lstStyle/>
-                    <a:p>
-                      <a:r>
-                        <a:rPr lang="en-IE" sz="2800" dirty="0" smtClean="0"/>
-                        <a:t>Explanation</a:t>
-                      </a:r>
-                      <a:endParaRPr lang="en-IE" sz="2800" dirty="0"/>
-                    </a:p>
-                  </a:txBody>
-                  <a:tcPr>
-                    <a:lnL w="12700" cap="flat" cmpd="sng" algn="ctr">
-                      <a:solidFill>
-                        <a:schemeClr val="tx1"/>
-                      </a:solidFill>
-                      <a:prstDash val="solid"/>
-                      <a:round/>
-                      <a:headEnd type="none" w="med" len="med"/>
-                      <a:tailEnd type="none" w="med" len="med"/>
-                    </a:lnL>
-                    <a:lnR w="12700" cap="flat" cmpd="sng" algn="ctr">
-                      <a:solidFill>
-                        <a:schemeClr val="tx1"/>
-                      </a:solidFill>
-                      <a:prstDash val="solid"/>
-                      <a:round/>
-                      <a:headEnd type="none" w="med" len="med"/>
-                      <a:tailEnd type="none" w="med" len="med"/>
-                    </a:lnR>
-                    <a:lnT w="12700" cap="flat" cmpd="sng" algn="ctr">
-                      <a:solidFill>
-                        <a:schemeClr val="tx1"/>
-                      </a:solidFill>
-                      <a:prstDash val="solid"/>
-                      <a:round/>
-                      <a:headEnd type="none" w="med" len="med"/>
-                      <a:tailEnd type="none" w="med" len="med"/>
-                    </a:lnT>
-                    <a:lnB w="12700" cap="flat" cmpd="sng" algn="ctr">
-                      <a:solidFill>
-                        <a:schemeClr val="tx1"/>
-                      </a:solidFill>
-                      <a:prstDash val="solid"/>
-                      <a:round/>
-                      <a:headEnd type="none" w="med" len="med"/>
-                      <a:tailEnd type="none" w="med" len="med"/>
-                    </a:lnB>
-                  </a:tcPr>
-                </a:tc>
-                <a:tc>
-                  <a:txBody>
-                    <a:bodyPr/>
-                    <a:lstStyle/>
-                    <a:p>
-                      <a:r>
-                        <a:rPr lang="en-IE" sz="2800" dirty="0" smtClean="0"/>
-                        <a:t>Example(s)</a:t>
-                      </a:r>
-                      <a:endParaRPr lang="en-IE" sz="2800" dirty="0"/>
-                    </a:p>
-                  </a:txBody>
-                  <a:tcPr>
-                    <a:lnL w="12700" cap="flat" cmpd="sng" algn="ctr">
-                      <a:solidFill>
-                        <a:schemeClr val="tx1"/>
-                      </a:solidFill>
-                      <a:prstDash val="solid"/>
-                      <a:round/>
-                      <a:headEnd type="none" w="med" len="med"/>
-                      <a:tailEnd type="none" w="med" len="med"/>
-                    </a:lnL>
-                    <a:lnR w="12700" cap="flat" cmpd="sng" algn="ctr">
-                      <a:solidFill>
-                        <a:schemeClr val="tx1"/>
-                      </a:solidFill>
-                      <a:prstDash val="solid"/>
-                      <a:round/>
-                      <a:headEnd type="none" w="med" len="med"/>
-                      <a:tailEnd type="none" w="med" len="med"/>
-                    </a:lnR>
-                    <a:lnT w="12700" cap="flat" cmpd="sng" algn="ctr">
-                      <a:solidFill>
-                        <a:schemeClr val="tx1"/>
-                      </a:solidFill>
-                      <a:prstDash val="solid"/>
-                      <a:round/>
-                      <a:headEnd type="none" w="med" len="med"/>
-                      <a:tailEnd type="none" w="med" len="med"/>
-                    </a:lnT>
-                    <a:lnB w="12700" cap="flat" cmpd="sng" algn="ctr">
-                      <a:solidFill>
-                        <a:schemeClr val="tx1"/>
-                      </a:solidFill>
-                      <a:prstDash val="solid"/>
-                      <a:round/>
-                      <a:headEnd type="none" w="med" len="med"/>
-                      <a:tailEnd type="none" w="med" len="med"/>
-                    </a:lnB>
-                  </a:tcPr>
-                </a:tc>
-              </a:tr>
-              <a:tr h="771844">
-                <a:tc>
-                  <a:txBody>
-                    <a:bodyPr/>
-                    <a:lstStyle/>
-                    <a:p>
-                      <a:r>
-                        <a:rPr lang="en-IE" sz="5400" dirty="0" smtClean="0"/>
-                        <a:t>   +</a:t>
-                      </a:r>
-                      <a:endParaRPr lang="en-IE" sz="5400" dirty="0"/>
-                    </a:p>
-                  </a:txBody>
-                  <a:tcPr>
-                    <a:lnL w="12700" cap="flat" cmpd="sng" algn="ctr">
-                      <a:solidFill>
-                        <a:schemeClr val="tx1"/>
-                      </a:solidFill>
-                      <a:prstDash val="solid"/>
-                      <a:round/>
-                      <a:headEnd type="none" w="med" len="med"/>
-                      <a:tailEnd type="none" w="med" len="med"/>
-                    </a:lnL>
-                    <a:lnR w="12700" cap="flat" cmpd="sng" algn="ctr">
-                      <a:solidFill>
-                        <a:schemeClr val="tx1"/>
-                      </a:solidFill>
-                      <a:prstDash val="solid"/>
-                      <a:round/>
-                      <a:headEnd type="none" w="med" len="med"/>
-                      <a:tailEnd type="none" w="med" len="med"/>
-                    </a:lnR>
-                    <a:lnT w="12700" cap="flat" cmpd="sng" algn="ctr">
-                      <a:solidFill>
-                        <a:schemeClr val="tx1"/>
-                      </a:solidFill>
-                      <a:prstDash val="solid"/>
-                      <a:round/>
-                      <a:headEnd type="none" w="med" len="med"/>
-                      <a:tailEnd type="none" w="med" len="med"/>
-                    </a:lnT>
-                    <a:lnB w="12700" cap="flat" cmpd="sng" algn="ctr">
-                      <a:solidFill>
-                        <a:schemeClr val="tx1"/>
-                      </a:solidFill>
-                      <a:prstDash val="solid"/>
-                      <a:round/>
-                      <a:headEnd type="none" w="med" len="med"/>
-                      <a:tailEnd type="none" w="med" len="med"/>
-                    </a:lnB>
-                  </a:tcPr>
-                </a:tc>
-                <a:tc>
-                  <a:txBody>
-                    <a:bodyPr/>
-                    <a:lstStyle/>
-                    <a:p>
-                      <a:pPr algn="l"/>
-                      <a:r>
-                        <a:rPr lang="en-IE" sz="2800" dirty="0" smtClean="0"/>
-                        <a:t>Addition</a:t>
-                      </a:r>
-                      <a:endParaRPr lang="en-IE" sz="2800" dirty="0"/>
-                    </a:p>
-                  </a:txBody>
-                  <a:tcPr anchor="ctr">
-                    <a:lnL w="12700" cap="flat" cmpd="sng" algn="ctr">
-                      <a:solidFill>
-                        <a:schemeClr val="tx1"/>
-                      </a:solidFill>
-                      <a:prstDash val="solid"/>
-                      <a:round/>
-                      <a:headEnd type="none" w="med" len="med"/>
-                      <a:tailEnd type="none" w="med" len="med"/>
-                    </a:lnL>
-                    <a:lnR w="12700" cap="flat" cmpd="sng" algn="ctr">
-                      <a:solidFill>
-                        <a:schemeClr val="tx1"/>
-                      </a:solidFill>
-                      <a:prstDash val="solid"/>
-                      <a:round/>
-                      <a:headEnd type="none" w="med" len="med"/>
-                      <a:tailEnd type="none" w="med" len="med"/>
-                    </a:lnR>
-                    <a:lnT w="12700" cap="flat" cmpd="sng" algn="ctr">
-                      <a:solidFill>
-                        <a:schemeClr val="tx1"/>
-                      </a:solidFill>
-                      <a:prstDash val="solid"/>
-                      <a:round/>
-                      <a:headEnd type="none" w="med" len="med"/>
-                      <a:tailEnd type="none" w="med" len="med"/>
-                    </a:lnT>
-                    <a:lnB w="12700" cap="flat" cmpd="sng" algn="ctr">
-                      <a:solidFill>
-                        <a:schemeClr val="tx1"/>
-                      </a:solidFill>
-                      <a:prstDash val="solid"/>
-                      <a:round/>
-                      <a:headEnd type="none" w="med" len="med"/>
-                      <a:tailEnd type="none" w="med" len="med"/>
-                    </a:lnB>
-                  </a:tcPr>
-                </a:tc>
-                <a:tc>
-                  <a:txBody>
-                    <a:bodyPr/>
-                    <a:lstStyle/>
-                    <a:p>
-                      <a:r>
-                        <a:rPr lang="en-IE" sz="2800" dirty="0" smtClean="0"/>
-                        <a:t>6 + 2</a:t>
-                      </a:r>
-                    </a:p>
-                    <a:p>
-                      <a:r>
-                        <a:rPr lang="en-IE" sz="2800" dirty="0" err="1" smtClean="0"/>
-                        <a:t>amountOwed</a:t>
-                      </a:r>
-                      <a:r>
-                        <a:rPr lang="en-IE" sz="2800" baseline="0" dirty="0" smtClean="0"/>
-                        <a:t>  + 10</a:t>
-                      </a:r>
-                      <a:endParaRPr lang="en-IE" sz="2800" dirty="0"/>
-                    </a:p>
-                  </a:txBody>
-                  <a:tcPr>
-                    <a:lnL w="12700" cap="flat" cmpd="sng" algn="ctr">
-                      <a:solidFill>
-                        <a:schemeClr val="tx1"/>
-                      </a:solidFill>
-                      <a:prstDash val="solid"/>
-                      <a:round/>
-                      <a:headEnd type="none" w="med" len="med"/>
-                      <a:tailEnd type="none" w="med" len="med"/>
-                    </a:lnL>
-                    <a:lnR w="12700" cap="flat" cmpd="sng" algn="ctr">
-                      <a:solidFill>
-                        <a:schemeClr val="tx1"/>
-                      </a:solidFill>
-                      <a:prstDash val="solid"/>
-                      <a:round/>
-                      <a:headEnd type="none" w="med" len="med"/>
-                      <a:tailEnd type="none" w="med" len="med"/>
-                    </a:lnR>
-                    <a:lnT w="12700" cap="flat" cmpd="sng" algn="ctr">
-                      <a:solidFill>
-                        <a:schemeClr val="tx1"/>
-                      </a:solidFill>
-                      <a:prstDash val="solid"/>
-                      <a:round/>
-                      <a:headEnd type="none" w="med" len="med"/>
-                      <a:tailEnd type="none" w="med" len="med"/>
-                    </a:lnT>
-                    <a:lnB w="12700" cap="flat" cmpd="sng" algn="ctr">
-                      <a:solidFill>
-                        <a:schemeClr val="tx1"/>
-                      </a:solidFill>
-                      <a:prstDash val="solid"/>
-                      <a:round/>
-                      <a:headEnd type="none" w="med" len="med"/>
-                      <a:tailEnd type="none" w="med" len="med"/>
-                    </a:lnB>
-                  </a:tcPr>
-                </a:tc>
-              </a:tr>
-              <a:tr h="771844">
-                <a:tc>
-                  <a:txBody>
-                    <a:bodyPr/>
-                    <a:lstStyle/>
-                    <a:p>
-                      <a:r>
-                        <a:rPr lang="en-IE" sz="5400" dirty="0" smtClean="0"/>
-                        <a:t>   - </a:t>
-                      </a:r>
-                      <a:endParaRPr lang="en-IE" sz="5400" dirty="0"/>
-                    </a:p>
-                  </a:txBody>
-                  <a:tcPr>
-                    <a:lnL w="12700" cap="flat" cmpd="sng" algn="ctr">
-                      <a:solidFill>
-                        <a:schemeClr val="tx1"/>
-                      </a:solidFill>
-                      <a:prstDash val="solid"/>
-                      <a:round/>
-                      <a:headEnd type="none" w="med" len="med"/>
-                      <a:tailEnd type="none" w="med" len="med"/>
-                    </a:lnL>
-                    <a:lnR w="12700" cap="flat" cmpd="sng" algn="ctr">
-                      <a:solidFill>
-                        <a:schemeClr val="tx1"/>
-                      </a:solidFill>
-                      <a:prstDash val="solid"/>
-                      <a:round/>
-                      <a:headEnd type="none" w="med" len="med"/>
-                      <a:tailEnd type="none" w="med" len="med"/>
-                    </a:lnR>
-                    <a:lnT w="12700" cap="flat" cmpd="sng" algn="ctr">
-                      <a:solidFill>
-                        <a:schemeClr val="tx1"/>
-                      </a:solidFill>
-                      <a:prstDash val="solid"/>
-                      <a:round/>
-                      <a:headEnd type="none" w="med" len="med"/>
-                      <a:tailEnd type="none" w="med" len="med"/>
-                    </a:lnT>
-                    <a:lnB w="12700" cap="flat" cmpd="sng" algn="ctr">
-                      <a:solidFill>
-                        <a:schemeClr val="tx1"/>
-                      </a:solidFill>
-                      <a:prstDash val="solid"/>
-                      <a:round/>
-                      <a:headEnd type="none" w="med" len="med"/>
-                      <a:tailEnd type="none" w="med" len="med"/>
-                    </a:lnB>
-                  </a:tcPr>
-                </a:tc>
-                <a:tc>
-                  <a:txBody>
-                    <a:bodyPr/>
-                    <a:lstStyle/>
-                    <a:p>
-                      <a:pPr algn="l"/>
-                      <a:r>
-                        <a:rPr lang="en-IE" sz="2800" dirty="0" smtClean="0"/>
-                        <a:t>Subtraction</a:t>
-                      </a:r>
-                      <a:endParaRPr lang="en-IE" sz="2800" dirty="0"/>
-                    </a:p>
-                  </a:txBody>
-                  <a:tcPr anchor="ctr">
-                    <a:lnL w="12700" cap="flat" cmpd="sng" algn="ctr">
-                      <a:solidFill>
-                        <a:schemeClr val="tx1"/>
-                      </a:solidFill>
-                      <a:prstDash val="solid"/>
-                      <a:round/>
-                      <a:headEnd type="none" w="med" len="med"/>
-                      <a:tailEnd type="none" w="med" len="med"/>
-                    </a:lnL>
-                    <a:lnR w="12700" cap="flat" cmpd="sng" algn="ctr">
-                      <a:solidFill>
-                        <a:schemeClr val="tx1"/>
-                      </a:solidFill>
-                      <a:prstDash val="solid"/>
-                      <a:round/>
-                      <a:headEnd type="none" w="med" len="med"/>
-                      <a:tailEnd type="none" w="med" len="med"/>
-                    </a:lnR>
-                    <a:lnT w="12700" cap="flat" cmpd="sng" algn="ctr">
-                      <a:solidFill>
-                        <a:schemeClr val="tx1"/>
-                      </a:solidFill>
-                      <a:prstDash val="solid"/>
-                      <a:round/>
-                      <a:headEnd type="none" w="med" len="med"/>
-                      <a:tailEnd type="none" w="med" len="med"/>
-                    </a:lnT>
-                    <a:lnB w="12700" cap="flat" cmpd="sng" algn="ctr">
-                      <a:solidFill>
-                        <a:schemeClr val="tx1"/>
-                      </a:solidFill>
-                      <a:prstDash val="solid"/>
-                      <a:round/>
-                      <a:headEnd type="none" w="med" len="med"/>
-                      <a:tailEnd type="none" w="med" len="med"/>
-                    </a:lnB>
-                  </a:tcPr>
-                </a:tc>
-                <a:tc>
-                  <a:txBody>
-                    <a:bodyPr/>
-                    <a:lstStyle/>
-                    <a:p>
-                      <a:r>
-                        <a:rPr lang="en-IE" sz="2800" dirty="0" smtClean="0"/>
-                        <a:t>6 – 2</a:t>
-                      </a:r>
-                    </a:p>
-                    <a:p>
-                      <a:r>
-                        <a:rPr lang="en-IE" sz="2800" dirty="0" err="1" smtClean="0"/>
-                        <a:t>amountOwed</a:t>
-                      </a:r>
-                      <a:r>
-                        <a:rPr lang="en-IE" sz="2800" dirty="0" smtClean="0"/>
-                        <a:t>  – 10</a:t>
-                      </a:r>
-                      <a:endParaRPr lang="en-IE" sz="2800" dirty="0"/>
-                    </a:p>
-                  </a:txBody>
-                  <a:tcPr>
-                    <a:lnL w="12700" cap="flat" cmpd="sng" algn="ctr">
-                      <a:solidFill>
-                        <a:schemeClr val="tx1"/>
-                      </a:solidFill>
-                      <a:prstDash val="solid"/>
-                      <a:round/>
-                      <a:headEnd type="none" w="med" len="med"/>
-                      <a:tailEnd type="none" w="med" len="med"/>
-                    </a:lnL>
-                    <a:lnR w="12700" cap="flat" cmpd="sng" algn="ctr">
-                      <a:solidFill>
-                        <a:schemeClr val="tx1"/>
-                      </a:solidFill>
-                      <a:prstDash val="solid"/>
-                      <a:round/>
-                      <a:headEnd type="none" w="med" len="med"/>
-                      <a:tailEnd type="none" w="med" len="med"/>
-                    </a:lnR>
-                    <a:lnT w="12700" cap="flat" cmpd="sng" algn="ctr">
-                      <a:solidFill>
-                        <a:schemeClr val="tx1"/>
-                      </a:solidFill>
-                      <a:prstDash val="solid"/>
-                      <a:round/>
-                      <a:headEnd type="none" w="med" len="med"/>
-                      <a:tailEnd type="none" w="med" len="med"/>
-                    </a:lnT>
-                    <a:lnB w="12700" cap="flat" cmpd="sng" algn="ctr">
-                      <a:solidFill>
-                        <a:schemeClr val="tx1"/>
-                      </a:solidFill>
-                      <a:prstDash val="solid"/>
-                      <a:round/>
-                      <a:headEnd type="none" w="med" len="med"/>
-                      <a:tailEnd type="none" w="med" len="med"/>
-                    </a:lnB>
-                  </a:tcPr>
-                </a:tc>
-              </a:tr>
-              <a:tr h="771844">
-                <a:tc>
-                  <a:txBody>
-                    <a:bodyPr/>
-                    <a:lstStyle/>
-                    <a:p>
-                      <a:r>
-                        <a:rPr lang="en-IE" sz="5400" dirty="0" smtClean="0"/>
-                        <a:t>   *</a:t>
-                      </a:r>
-                      <a:endParaRPr lang="en-IE" sz="5400" dirty="0"/>
-                    </a:p>
-                  </a:txBody>
-                  <a:tcPr>
-                    <a:lnL w="12700" cap="flat" cmpd="sng" algn="ctr">
-                      <a:solidFill>
-                        <a:schemeClr val="tx1"/>
-                      </a:solidFill>
-                      <a:prstDash val="solid"/>
-                      <a:round/>
-                      <a:headEnd type="none" w="med" len="med"/>
-                      <a:tailEnd type="none" w="med" len="med"/>
-                    </a:lnL>
-                    <a:lnR w="12700" cap="flat" cmpd="sng" algn="ctr">
-                      <a:solidFill>
-                        <a:schemeClr val="tx1"/>
-                      </a:solidFill>
-                      <a:prstDash val="solid"/>
-                      <a:round/>
-                      <a:headEnd type="none" w="med" len="med"/>
-                      <a:tailEnd type="none" w="med" len="med"/>
-                    </a:lnR>
-                    <a:lnT w="12700" cap="flat" cmpd="sng" algn="ctr">
-                      <a:solidFill>
-                        <a:schemeClr val="tx1"/>
-                      </a:solidFill>
-                      <a:prstDash val="solid"/>
-                      <a:round/>
-                      <a:headEnd type="none" w="med" len="med"/>
-                      <a:tailEnd type="none" w="med" len="med"/>
-                    </a:lnT>
-                    <a:lnB w="12700" cap="flat" cmpd="sng" algn="ctr">
-                      <a:solidFill>
-                        <a:schemeClr val="tx1"/>
-                      </a:solidFill>
-                      <a:prstDash val="solid"/>
-                      <a:round/>
-                      <a:headEnd type="none" w="med" len="med"/>
-                      <a:tailEnd type="none" w="med" len="med"/>
-                    </a:lnB>
-                  </a:tcPr>
-                </a:tc>
-                <a:tc>
-                  <a:txBody>
-                    <a:bodyPr/>
-                    <a:lstStyle/>
-                    <a:p>
-                      <a:pPr algn="l"/>
-                      <a:r>
-                        <a:rPr lang="en-IE" sz="2800" dirty="0" smtClean="0"/>
-                        <a:t>Multiplication</a:t>
-                      </a:r>
-                      <a:endParaRPr lang="en-IE" sz="2800" dirty="0"/>
-                    </a:p>
-                  </a:txBody>
-                  <a:tcPr anchor="ctr">
-                    <a:lnL w="12700" cap="flat" cmpd="sng" algn="ctr">
-                      <a:solidFill>
-                        <a:schemeClr val="tx1"/>
-                      </a:solidFill>
-                      <a:prstDash val="solid"/>
-                      <a:round/>
-                      <a:headEnd type="none" w="med" len="med"/>
-                      <a:tailEnd type="none" w="med" len="med"/>
-                    </a:lnL>
-                    <a:lnR w="12700" cap="flat" cmpd="sng" algn="ctr">
-                      <a:solidFill>
-                        <a:schemeClr val="tx1"/>
-                      </a:solidFill>
-                      <a:prstDash val="solid"/>
-                      <a:round/>
-                      <a:headEnd type="none" w="med" len="med"/>
-                      <a:tailEnd type="none" w="med" len="med"/>
-                    </a:lnR>
-                    <a:lnT w="12700" cap="flat" cmpd="sng" algn="ctr">
-                      <a:solidFill>
-                        <a:schemeClr val="tx1"/>
-                      </a:solidFill>
-                      <a:prstDash val="solid"/>
-                      <a:round/>
-                      <a:headEnd type="none" w="med" len="med"/>
-                      <a:tailEnd type="none" w="med" len="med"/>
-                    </a:lnT>
-                    <a:lnB w="12700" cap="flat" cmpd="sng" algn="ctr">
-                      <a:solidFill>
-                        <a:schemeClr val="tx1"/>
-                      </a:solidFill>
-                      <a:prstDash val="solid"/>
-                      <a:round/>
-                      <a:headEnd type="none" w="med" len="med"/>
-                      <a:tailEnd type="none" w="med" len="med"/>
-                    </a:lnB>
-                  </a:tcPr>
-                </a:tc>
-                <a:tc>
-                  <a:txBody>
-                    <a:bodyPr/>
-                    <a:lstStyle/>
-                    <a:p>
-                      <a:r>
-                        <a:rPr lang="en-IE" sz="2800" dirty="0" smtClean="0"/>
-                        <a:t>6 * 2</a:t>
-                      </a:r>
-                    </a:p>
-                    <a:p>
-                      <a:r>
-                        <a:rPr lang="en-IE" sz="2800" dirty="0" err="1" smtClean="0"/>
-                        <a:t>amountOwed</a:t>
-                      </a:r>
-                      <a:r>
-                        <a:rPr lang="en-IE" sz="2800" dirty="0" smtClean="0"/>
-                        <a:t> </a:t>
-                      </a:r>
-                      <a:r>
-                        <a:rPr lang="en-IE" sz="2800" baseline="0" dirty="0" smtClean="0"/>
-                        <a:t> *</a:t>
-                      </a:r>
-                      <a:r>
-                        <a:rPr lang="en-IE" sz="2800" dirty="0" smtClean="0"/>
-                        <a:t> 10</a:t>
-                      </a:r>
-                    </a:p>
-                  </a:txBody>
-                  <a:tcPr>
-                    <a:lnL w="12700" cap="flat" cmpd="sng" algn="ctr">
-                      <a:solidFill>
-                        <a:schemeClr val="tx1"/>
-                      </a:solidFill>
-                      <a:prstDash val="solid"/>
-                      <a:round/>
-                      <a:headEnd type="none" w="med" len="med"/>
-                      <a:tailEnd type="none" w="med" len="med"/>
-                    </a:lnL>
-                    <a:lnR w="12700" cap="flat" cmpd="sng" algn="ctr">
-                      <a:solidFill>
-                        <a:schemeClr val="tx1"/>
-                      </a:solidFill>
-                      <a:prstDash val="solid"/>
-                      <a:round/>
-                      <a:headEnd type="none" w="med" len="med"/>
-                      <a:tailEnd type="none" w="med" len="med"/>
-                    </a:lnR>
-                    <a:lnT w="12700" cap="flat" cmpd="sng" algn="ctr">
-                      <a:solidFill>
-                        <a:schemeClr val="tx1"/>
-                      </a:solidFill>
-                      <a:prstDash val="solid"/>
-                      <a:round/>
-                      <a:headEnd type="none" w="med" len="med"/>
-                      <a:tailEnd type="none" w="med" len="med"/>
-                    </a:lnT>
-                    <a:lnB w="12700" cap="flat" cmpd="sng" algn="ctr">
-                      <a:solidFill>
-                        <a:schemeClr val="tx1"/>
-                      </a:solidFill>
-                      <a:prstDash val="solid"/>
-                      <a:round/>
-                      <a:headEnd type="none" w="med" len="med"/>
-                      <a:tailEnd type="none" w="med" len="med"/>
-                    </a:lnB>
-                  </a:tcPr>
-                </a:tc>
-              </a:tr>
-              <a:tr h="771844">
-                <a:tc>
-                  <a:txBody>
-                    <a:bodyPr/>
-                    <a:lstStyle/>
-                    <a:p>
-                      <a:r>
-                        <a:rPr lang="en-IE" sz="5400" dirty="0" smtClean="0"/>
-                        <a:t>   /</a:t>
-                      </a:r>
-                      <a:endParaRPr lang="en-IE" sz="5400" dirty="0"/>
-                    </a:p>
-                  </a:txBody>
-                  <a:tcPr>
-                    <a:lnL w="12700" cap="flat" cmpd="sng" algn="ctr">
-                      <a:solidFill>
-                        <a:schemeClr val="tx1"/>
-                      </a:solidFill>
-                      <a:prstDash val="solid"/>
-                      <a:round/>
-                      <a:headEnd type="none" w="med" len="med"/>
-                      <a:tailEnd type="none" w="med" len="med"/>
-                    </a:lnL>
-                    <a:lnR w="12700" cap="flat" cmpd="sng" algn="ctr">
-                      <a:solidFill>
-                        <a:schemeClr val="tx1"/>
-                      </a:solidFill>
-                      <a:prstDash val="solid"/>
-                      <a:round/>
-                      <a:headEnd type="none" w="med" len="med"/>
-                      <a:tailEnd type="none" w="med" len="med"/>
-                    </a:lnR>
-                    <a:lnT w="12700" cap="flat" cmpd="sng" algn="ctr">
-                      <a:solidFill>
-                        <a:schemeClr val="tx1"/>
-                      </a:solidFill>
-                      <a:prstDash val="solid"/>
-                      <a:round/>
-                      <a:headEnd type="none" w="med" len="med"/>
-                      <a:tailEnd type="none" w="med" len="med"/>
-                    </a:lnT>
-                    <a:lnB w="12700" cap="flat" cmpd="sng" algn="ctr">
-                      <a:solidFill>
-                        <a:schemeClr val="tx1"/>
-                      </a:solidFill>
-                      <a:prstDash val="solid"/>
-                      <a:round/>
-                      <a:headEnd type="none" w="med" len="med"/>
-                      <a:tailEnd type="none" w="med" len="med"/>
-                    </a:lnB>
-                  </a:tcPr>
-                </a:tc>
-                <a:tc>
-                  <a:txBody>
-                    <a:bodyPr/>
-                    <a:lstStyle/>
-                    <a:p>
-                      <a:pPr algn="l"/>
-                      <a:r>
-                        <a:rPr lang="en-IE" sz="2800" dirty="0" smtClean="0"/>
-                        <a:t>Division</a:t>
-                      </a:r>
-                      <a:endParaRPr lang="en-IE" sz="2800" dirty="0"/>
-                    </a:p>
-                  </a:txBody>
-                  <a:tcPr anchor="ctr">
-                    <a:lnL w="12700" cap="flat" cmpd="sng" algn="ctr">
-                      <a:solidFill>
-                        <a:schemeClr val="tx1"/>
-                      </a:solidFill>
-                      <a:prstDash val="solid"/>
-                      <a:round/>
-                      <a:headEnd type="none" w="med" len="med"/>
-                      <a:tailEnd type="none" w="med" len="med"/>
-                    </a:lnL>
-                    <a:lnR w="12700" cap="flat" cmpd="sng" algn="ctr">
-                      <a:solidFill>
-                        <a:schemeClr val="tx1"/>
-                      </a:solidFill>
-                      <a:prstDash val="solid"/>
-                      <a:round/>
-                      <a:headEnd type="none" w="med" len="med"/>
-                      <a:tailEnd type="none" w="med" len="med"/>
-                    </a:lnR>
-                    <a:lnT w="12700" cap="flat" cmpd="sng" algn="ctr">
-                      <a:solidFill>
-                        <a:schemeClr val="tx1"/>
-                      </a:solidFill>
-                      <a:prstDash val="solid"/>
-                      <a:round/>
-                      <a:headEnd type="none" w="med" len="med"/>
-                      <a:tailEnd type="none" w="med" len="med"/>
-                    </a:lnT>
-                    <a:lnB w="12700" cap="flat" cmpd="sng" algn="ctr">
-                      <a:solidFill>
-                        <a:schemeClr val="tx1"/>
-                      </a:solidFill>
-                      <a:prstDash val="solid"/>
-                      <a:round/>
-                      <a:headEnd type="none" w="med" len="med"/>
-                      <a:tailEnd type="none" w="med" len="med"/>
-                    </a:lnB>
-                  </a:tcPr>
-                </a:tc>
-                <a:tc>
-                  <a:txBody>
-                    <a:bodyPr/>
-                    <a:lstStyle/>
-                    <a:p>
-                      <a:r>
-                        <a:rPr lang="en-IE" sz="2800" dirty="0" smtClean="0"/>
-                        <a:t>6 / 2</a:t>
-                      </a:r>
-                    </a:p>
-                    <a:p>
-                      <a:r>
-                        <a:rPr lang="en-IE" sz="2800" dirty="0" err="1" smtClean="0"/>
-                        <a:t>amountOwed</a:t>
-                      </a:r>
-                      <a:r>
-                        <a:rPr lang="en-IE" sz="2800" dirty="0" smtClean="0"/>
-                        <a:t> </a:t>
-                      </a:r>
-                      <a:r>
-                        <a:rPr lang="en-IE" sz="2800" baseline="0" dirty="0" smtClean="0"/>
-                        <a:t> / </a:t>
-                      </a:r>
-                      <a:r>
-                        <a:rPr lang="en-IE" sz="2800" dirty="0" smtClean="0"/>
-                        <a:t>10</a:t>
-                      </a:r>
-                    </a:p>
-                  </a:txBody>
-                  <a:tcPr>
-                    <a:lnL w="12700" cap="flat" cmpd="sng" algn="ctr">
-                      <a:solidFill>
-                        <a:schemeClr val="tx1"/>
-                      </a:solidFill>
-                      <a:prstDash val="solid"/>
-                      <a:round/>
-                      <a:headEnd type="none" w="med" len="med"/>
-                      <a:tailEnd type="none" w="med" len="med"/>
-                    </a:lnL>
-                    <a:lnR w="12700" cap="flat" cmpd="sng" algn="ctr">
-                      <a:solidFill>
-                        <a:schemeClr val="tx1"/>
-                      </a:solidFill>
-                      <a:prstDash val="solid"/>
-                      <a:round/>
-                      <a:headEnd type="none" w="med" len="med"/>
-                      <a:tailEnd type="none" w="med" len="med"/>
-                    </a:lnR>
-                    <a:lnT w="12700" cap="flat" cmpd="sng" algn="ctr">
-                      <a:solidFill>
-                        <a:schemeClr val="tx1"/>
-                      </a:solidFill>
-                      <a:prstDash val="solid"/>
-                      <a:round/>
-                      <a:headEnd type="none" w="med" len="med"/>
-                      <a:tailEnd type="none" w="med" len="med"/>
-                    </a:lnT>
-                    <a:lnB w="12700" cap="flat" cmpd="sng" algn="ctr">
-                      <a:solidFill>
-                        <a:schemeClr val="tx1"/>
-                      </a:solidFill>
-                      <a:prstDash val="solid"/>
-                      <a:round/>
-                      <a:headEnd type="none" w="med" len="med"/>
-                      <a:tailEnd type="none" w="med" len="med"/>
-                    </a:lnB>
-                  </a:tcPr>
-                </a:tc>
-              </a:tr>
-            </a:tbl>
-          </a:graphicData>
-        </a:graphic>
-      </p:graphicFrame>
-    </p:spTree>
-    <p:extLst>
-      <p:ext uri="{BB962C8B-B14F-4D97-AF65-F5344CB8AC3E}">
-        <p14:creationId xmlns:p14="http://schemas.microsoft.com/office/powerpoint/2010/main" val="2961970664"/>
-      </p:ext>
-    </p:extLst>
-  </p:cSld>
-  <p:clrMapOvr>
-    <a:masterClrMapping/>
-  </p:clrMapOvr>
-</p:sld>
-</file>
-
-<file path=ppt/slides/slide17.xml><?xml version="1.0" encoding="utf-8"?>
-<p:sld xmlns:a="http://schemas.openxmlformats.org/drawingml/2006/main" xmlns:r="http://schemas.openxmlformats.org/officeDocument/2006/relationships" xmlns:p="http://schemas.openxmlformats.org/presentationml/2006/main">
-  <p:cSld>
-    <p:spTree>
-      <p:nvGrpSpPr>
-        <p:cNvPr id="1" name=""/>
-        <p:cNvGrpSpPr/>
-        <p:nvPr/>
-      </p:nvGrpSpPr>
-      <p:grpSpPr>
-        <a:xfrm>
-          <a:off x="0" y="0"/>
-          <a:ext cx="0" cy="0"/>
-          <a:chOff x="0" y="0"/>
-          <a:chExt cx="0" cy="0"/>
-        </a:xfrm>
-      </p:grpSpPr>
-      <p:sp>
-        <p:nvSpPr>
-          <p:cNvPr id="2" name="Title 1"/>
-          <p:cNvSpPr>
-            <a:spLocks noGrp="1"/>
-          </p:cNvSpPr>
-          <p:nvPr>
-            <p:ph type="title"/>
-          </p:nvPr>
-        </p:nvSpPr>
-        <p:spPr>
-          <a:xfrm>
-            <a:off x="457200" y="274638"/>
-            <a:ext cx="8534400" cy="1143000"/>
-          </a:xfrm>
-        </p:spPr>
-        <p:txBody>
-          <a:bodyPr>
-            <a:normAutofit/>
-          </a:bodyPr>
-          <a:lstStyle/>
-          <a:p>
-            <a:r>
-              <a:rPr lang="en-IE" sz="3600" dirty="0" smtClean="0"/>
-              <a:t>Recap: Arithmetic operators: Example 3.6</a:t>
-            </a:r>
-            <a:endParaRPr lang="en-IE" sz="3600" dirty="0"/>
-          </a:p>
-        </p:txBody>
-      </p:sp>
-      <p:sp>
-        <p:nvSpPr>
-          <p:cNvPr id="4" name="Rectangle 3"/>
-          <p:cNvSpPr/>
-          <p:nvPr/>
-        </p:nvSpPr>
-        <p:spPr>
-          <a:xfrm>
-            <a:off x="3230202" y="6448563"/>
-            <a:ext cx="5913798" cy="369332"/>
-          </a:xfrm>
-          <a:prstGeom prst="rect">
-            <a:avLst/>
-          </a:prstGeom>
-        </p:spPr>
-        <p:txBody>
-          <a:bodyPr wrap="none">
-            <a:spAutoFit/>
-          </a:bodyPr>
-          <a:lstStyle/>
-          <a:p>
-            <a:pPr lvl="0"/>
-            <a:r>
-              <a:rPr lang="en-IE" dirty="0" smtClean="0"/>
-              <a:t>Based on the Processing Example: Basics</a:t>
-            </a:r>
-            <a:r>
-              <a:rPr lang="en-IE" dirty="0"/>
-              <a:t> </a:t>
-            </a:r>
-            <a:r>
-              <a:rPr lang="en-IE" dirty="0" smtClean="0">
-                <a:sym typeface="Wingdings" panose="05000000000000000000" pitchFamily="2" charset="2"/>
-              </a:rPr>
-              <a:t></a:t>
-            </a:r>
-            <a:r>
-              <a:rPr lang="en-IE" dirty="0" smtClean="0"/>
-              <a:t> Data </a:t>
-            </a:r>
-            <a:r>
-              <a:rPr lang="en-IE" dirty="0" smtClean="0">
-                <a:sym typeface="Wingdings" panose="05000000000000000000" pitchFamily="2" charset="2"/>
-              </a:rPr>
-              <a:t> </a:t>
-            </a:r>
-            <a:r>
-              <a:rPr lang="en-IE" dirty="0" smtClean="0"/>
-              <a:t>Variables</a:t>
-            </a:r>
-            <a:endParaRPr lang="en-IE" dirty="0"/>
-          </a:p>
-        </p:txBody>
-      </p:sp>
-      <p:pic>
-        <p:nvPicPr>
-          <p:cNvPr id="1026" name="Picture 2"/>
-          <p:cNvPicPr>
-            <a:picLocks noChangeAspect="1" noChangeArrowheads="1"/>
-          </p:cNvPicPr>
-          <p:nvPr/>
-        </p:nvPicPr>
-        <p:blipFill rotWithShape="1">
-          <a:blip r:embed="rId3">
-            <a:extLst>
-              <a:ext uri="{28A0092B-C50C-407E-A947-70E740481C1C}">
-                <a14:useLocalDpi xmlns:a14="http://schemas.microsoft.com/office/drawing/2010/main" val="0"/>
-              </a:ext>
-            </a:extLst>
-          </a:blip>
-          <a:srcRect l="4666" t="32728" r="78393" b="35009"/>
-          <a:stretch/>
-        </p:blipFill>
-        <p:spPr bwMode="auto">
-          <a:xfrm>
-            <a:off x="457200" y="1779814"/>
-            <a:ext cx="4267200" cy="4568709"/>
-          </a:xfrm>
-          <a:prstGeom prst="rect">
-            <a:avLst/>
-          </a:prstGeom>
-          <a:noFill/>
-          <a:ln w="9525">
-            <a:solidFill>
-              <a:schemeClr val="tx1"/>
-            </a:solidFill>
-            <a:miter lim="800000"/>
-            <a:headEnd/>
-            <a:tailEnd/>
-          </a:ln>
-          <a:extLst>
-            <a:ext uri="{909E8E84-426E-40DD-AFC4-6F175D3DCCD1}">
-              <a14:hiddenFill xmlns:a14="http://schemas.microsoft.com/office/drawing/2010/main">
-                <a:solidFill>
-                  <a:schemeClr val="accent1"/>
-                </a:solidFill>
-              </a14:hiddenFill>
-            </a:ext>
-          </a:extLst>
-        </p:spPr>
-      </p:pic>
-      <p:pic>
-        <p:nvPicPr>
-          <p:cNvPr id="1027" name="Picture 3"/>
-          <p:cNvPicPr>
-            <a:picLocks noChangeAspect="1" noChangeArrowheads="1"/>
-          </p:cNvPicPr>
-          <p:nvPr/>
-        </p:nvPicPr>
-        <p:blipFill rotWithShape="1">
-          <a:blip r:embed="rId3">
-            <a:extLst>
-              <a:ext uri="{28A0092B-C50C-407E-A947-70E740481C1C}">
-                <a14:useLocalDpi xmlns:a14="http://schemas.microsoft.com/office/drawing/2010/main" val="0"/>
-              </a:ext>
-            </a:extLst>
-          </a:blip>
-          <a:srcRect l="43474" t="23661" r="18877" b="19866"/>
-          <a:stretch/>
-        </p:blipFill>
-        <p:spPr bwMode="auto">
-          <a:xfrm>
-            <a:off x="3962400" y="1600200"/>
-            <a:ext cx="4788854" cy="4038600"/>
-          </a:xfrm>
-          <a:prstGeom prst="rect">
-            <a:avLst/>
-          </a:prstGeom>
-          <a:noFill/>
-          <a:ln>
-            <a:noFill/>
-          </a:ln>
-          <a:extLst>
-            <a:ext uri="{909E8E84-426E-40DD-AFC4-6F175D3DCCD1}">
-              <a14:hiddenFill xmlns:a14="http://schemas.microsoft.com/office/drawing/2010/main">
-                <a:solidFill>
-                  <a:schemeClr val="accent1"/>
-                </a:solidFill>
-              </a14:hiddenFill>
-            </a:ext>
-            <a:ext uri="{91240B29-F687-4F45-9708-019B960494DF}">
-              <a14:hiddenLine xmlns:a14="http://schemas.microsoft.com/office/drawing/2010/main" w="9525">
-                <a:solidFill>
-                  <a:schemeClr val="tx1"/>
-                </a:solidFill>
-                <a:miter lim="800000"/>
-                <a:headEnd/>
-                <a:tailEnd/>
-              </a14:hiddenLine>
-            </a:ext>
-          </a:extLst>
-        </p:spPr>
-      </p:pic>
-    </p:spTree>
-    <p:extLst>
-      <p:ext uri="{BB962C8B-B14F-4D97-AF65-F5344CB8AC3E}">
-        <p14:creationId xmlns:p14="http://schemas.microsoft.com/office/powerpoint/2010/main" val="269669299"/>
-      </p:ext>
-    </p:extLst>
-  </p:cSld>
-  <p:clrMapOvr>
-    <a:masterClrMapping/>
-  </p:clrMapOvr>
-</p:sld>
-</file>
-
-<file path=ppt/slides/slide18.xml><?xml version="1.0" encoding="utf-8"?>
-<p:sld xmlns:a="http://schemas.openxmlformats.org/drawingml/2006/main" xmlns:r="http://schemas.openxmlformats.org/officeDocument/2006/relationships" xmlns:p="http://schemas.openxmlformats.org/presentationml/2006/main">
-  <p:cSld>
-    <p:spTree>
-      <p:nvGrpSpPr>
-        <p:cNvPr id="1" name=""/>
-        <p:cNvGrpSpPr/>
-        <p:nvPr/>
-      </p:nvGrpSpPr>
-      <p:grpSpPr>
-        <a:xfrm>
-          <a:off x="0" y="0"/>
-          <a:ext cx="0" cy="0"/>
-          <a:chOff x="0" y="0"/>
-          <a:chExt cx="0" cy="0"/>
-        </a:xfrm>
-      </p:grpSpPr>
-      <p:sp>
-        <p:nvSpPr>
-          <p:cNvPr id="2" name="Title 1"/>
-          <p:cNvSpPr>
-            <a:spLocks noGrp="1"/>
-          </p:cNvSpPr>
-          <p:nvPr>
-            <p:ph type="title"/>
-          </p:nvPr>
-        </p:nvSpPr>
-        <p:spPr>
-          <a:xfrm>
-            <a:off x="457199" y="274638"/>
-            <a:ext cx="8426793" cy="1143000"/>
-          </a:xfrm>
-        </p:spPr>
-        <p:txBody>
-          <a:bodyPr>
-            <a:normAutofit/>
-          </a:bodyPr>
-          <a:lstStyle/>
-          <a:p>
-            <a:r>
-              <a:rPr lang="en-IE" sz="3600" dirty="0" smtClean="0"/>
-              <a:t>Recap: Arithmetic operators: Example 3.8</a:t>
-            </a:r>
-            <a:endParaRPr lang="en-IE" sz="3600" dirty="0"/>
-          </a:p>
-        </p:txBody>
-      </p:sp>
-      <p:sp>
-        <p:nvSpPr>
-          <p:cNvPr id="4" name="Rectangle 3"/>
-          <p:cNvSpPr/>
-          <p:nvPr/>
-        </p:nvSpPr>
-        <p:spPr>
-          <a:xfrm>
-            <a:off x="3230202" y="6448563"/>
-            <a:ext cx="5913798" cy="369332"/>
-          </a:xfrm>
-          <a:prstGeom prst="rect">
-            <a:avLst/>
-          </a:prstGeom>
-        </p:spPr>
-        <p:txBody>
-          <a:bodyPr wrap="none">
-            <a:spAutoFit/>
-          </a:bodyPr>
-          <a:lstStyle/>
-          <a:p>
-            <a:pPr lvl="0"/>
-            <a:r>
-              <a:rPr lang="en-IE" dirty="0" smtClean="0"/>
-              <a:t>Based on the Processing Example: Basics</a:t>
-            </a:r>
-            <a:r>
-              <a:rPr lang="en-IE" dirty="0"/>
-              <a:t> </a:t>
-            </a:r>
-            <a:r>
-              <a:rPr lang="en-IE" dirty="0" smtClean="0">
-                <a:sym typeface="Wingdings" panose="05000000000000000000" pitchFamily="2" charset="2"/>
-              </a:rPr>
-              <a:t></a:t>
-            </a:r>
-            <a:r>
-              <a:rPr lang="en-IE" dirty="0" smtClean="0"/>
-              <a:t> Data </a:t>
-            </a:r>
-            <a:r>
-              <a:rPr lang="en-IE" dirty="0" smtClean="0">
-                <a:sym typeface="Wingdings" panose="05000000000000000000" pitchFamily="2" charset="2"/>
-              </a:rPr>
-              <a:t> </a:t>
-            </a:r>
-            <a:r>
-              <a:rPr lang="en-IE" dirty="0" smtClean="0"/>
-              <a:t>Variables</a:t>
-            </a:r>
-            <a:endParaRPr lang="en-IE" dirty="0"/>
-          </a:p>
-        </p:txBody>
-      </p:sp>
-      <p:pic>
-        <p:nvPicPr>
-          <p:cNvPr id="3075" name="Picture 3"/>
-          <p:cNvPicPr>
-            <a:picLocks noChangeAspect="1" noChangeArrowheads="1"/>
-          </p:cNvPicPr>
-          <p:nvPr/>
-        </p:nvPicPr>
-        <p:blipFill rotWithShape="1">
-          <a:blip r:embed="rId3">
-            <a:extLst>
-              <a:ext uri="{28A0092B-C50C-407E-A947-70E740481C1C}">
-                <a14:useLocalDpi xmlns:a14="http://schemas.microsoft.com/office/drawing/2010/main" val="0"/>
-              </a:ext>
-            </a:extLst>
-          </a:blip>
-          <a:srcRect l="4696" t="25670" r="79240" b="40625"/>
-          <a:stretch/>
-        </p:blipFill>
-        <p:spPr bwMode="auto">
-          <a:xfrm>
-            <a:off x="421820" y="1654689"/>
-            <a:ext cx="3635635" cy="4288911"/>
-          </a:xfrm>
-          <a:prstGeom prst="rect">
-            <a:avLst/>
-          </a:prstGeom>
-          <a:noFill/>
-          <a:ln w="9525">
-            <a:solidFill>
-              <a:schemeClr val="tx1"/>
-            </a:solidFill>
-            <a:miter lim="800000"/>
-            <a:headEnd/>
-            <a:tailEnd/>
-          </a:ln>
-          <a:extLst>
-            <a:ext uri="{909E8E84-426E-40DD-AFC4-6F175D3DCCD1}">
-              <a14:hiddenFill xmlns:a14="http://schemas.microsoft.com/office/drawing/2010/main">
-                <a:solidFill>
-                  <a:schemeClr val="accent1"/>
-                </a:solidFill>
-              </a14:hiddenFill>
-            </a:ext>
-          </a:extLst>
-        </p:spPr>
-      </p:pic>
-      <p:pic>
-        <p:nvPicPr>
-          <p:cNvPr id="3076" name="Picture 4"/>
-          <p:cNvPicPr>
-            <a:picLocks noChangeAspect="1" noChangeArrowheads="1"/>
-          </p:cNvPicPr>
-          <p:nvPr/>
-        </p:nvPicPr>
-        <p:blipFill rotWithShape="1">
-          <a:blip r:embed="rId3">
-            <a:extLst>
-              <a:ext uri="{28A0092B-C50C-407E-A947-70E740481C1C}">
-                <a14:useLocalDpi xmlns:a14="http://schemas.microsoft.com/office/drawing/2010/main" val="0"/>
-              </a:ext>
-            </a:extLst>
-          </a:blip>
-          <a:srcRect l="43349" t="23661" r="26280" b="44940"/>
-          <a:stretch/>
-        </p:blipFill>
-        <p:spPr bwMode="auto">
-          <a:xfrm>
-            <a:off x="3640347" y="2275144"/>
-            <a:ext cx="5243646" cy="3048000"/>
-          </a:xfrm>
-          <a:prstGeom prst="rect">
-            <a:avLst/>
-          </a:prstGeom>
-          <a:noFill/>
-          <a:ln>
-            <a:noFill/>
-          </a:ln>
-          <a:extLst>
-            <a:ext uri="{909E8E84-426E-40DD-AFC4-6F175D3DCCD1}">
-              <a14:hiddenFill xmlns:a14="http://schemas.microsoft.com/office/drawing/2010/main">
-                <a:solidFill>
-                  <a:schemeClr val="accent1"/>
-                </a:solidFill>
-              </a14:hiddenFill>
-            </a:ext>
-            <a:ext uri="{91240B29-F687-4F45-9708-019B960494DF}">
-              <a14:hiddenLine xmlns:a14="http://schemas.microsoft.com/office/drawing/2010/main" w="9525">
-                <a:solidFill>
-                  <a:schemeClr val="tx1"/>
-                </a:solidFill>
-                <a:miter lim="800000"/>
-                <a:headEnd/>
-                <a:tailEnd/>
-              </a14:hiddenLine>
-            </a:ext>
-          </a:extLst>
-        </p:spPr>
-      </p:pic>
-    </p:spTree>
-    <p:extLst>
-      <p:ext uri="{BB962C8B-B14F-4D97-AF65-F5344CB8AC3E}">
-        <p14:creationId xmlns:p14="http://schemas.microsoft.com/office/powerpoint/2010/main" val="2453024907"/>
-      </p:ext>
-    </p:extLst>
-  </p:cSld>
-  <p:clrMapOvr>
-    <a:masterClrMapping/>
-  </p:clrMapOvr>
-</p:sld>
-</file>
-
-<file path=ppt/slides/slide19.xml><?xml version="1.0" encoding="utf-8"?>
-<p:sld xmlns:a="http://schemas.openxmlformats.org/drawingml/2006/main" xmlns:r="http://schemas.openxmlformats.org/officeDocument/2006/relationships" xmlns:p="http://schemas.openxmlformats.org/presentationml/2006/main">
-  <p:cSld>
-    <p:spTree>
-      <p:nvGrpSpPr>
-        <p:cNvPr id="1" name=""/>
-        <p:cNvGrpSpPr/>
-        <p:nvPr/>
-      </p:nvGrpSpPr>
-      <p:grpSpPr>
-        <a:xfrm>
-          <a:off x="0" y="0"/>
-          <a:ext cx="0" cy="0"/>
-          <a:chOff x="0" y="0"/>
-          <a:chExt cx="0" cy="0"/>
-        </a:xfrm>
-      </p:grpSpPr>
-      <p:sp>
-        <p:nvSpPr>
-          <p:cNvPr id="2" name="Title 1"/>
-          <p:cNvSpPr>
-            <a:spLocks noGrp="1"/>
-          </p:cNvSpPr>
-          <p:nvPr>
-            <p:ph type="title"/>
-          </p:nvPr>
-        </p:nvSpPr>
-        <p:spPr/>
-        <p:txBody>
-          <a:bodyPr/>
-          <a:lstStyle/>
-          <a:p>
-            <a:r>
-              <a:rPr lang="en-IE" dirty="0" smtClean="0"/>
-              <a:t>Arithmetic Operators</a:t>
-            </a:r>
-            <a:endParaRPr lang="en-IE" dirty="0"/>
-          </a:p>
-        </p:txBody>
-      </p:sp>
-      <p:sp>
-        <p:nvSpPr>
-          <p:cNvPr id="3" name="Content Placeholder 2"/>
-          <p:cNvSpPr>
-            <a:spLocks noGrp="1"/>
-          </p:cNvSpPr>
-          <p:nvPr>
-            <p:ph idx="1"/>
-          </p:nvPr>
-        </p:nvSpPr>
-        <p:spPr/>
-        <p:txBody>
-          <a:bodyPr/>
-          <a:lstStyle/>
-          <a:p>
-            <a:r>
-              <a:rPr lang="en-IE" dirty="0" smtClean="0"/>
-              <a:t>If you want to keep track of how many times something happens, you are keeping a </a:t>
-            </a:r>
-            <a:r>
-              <a:rPr lang="en-IE" b="1" dirty="0" smtClean="0"/>
-              <a:t>running total</a:t>
-            </a:r>
-            <a:r>
-              <a:rPr lang="en-IE" dirty="0"/>
-              <a:t> </a:t>
-            </a:r>
-            <a:r>
-              <a:rPr lang="en-IE" dirty="0" smtClean="0"/>
-              <a:t>e.g.</a:t>
-            </a:r>
-          </a:p>
-          <a:p>
-            <a:pPr lvl="1"/>
-            <a:r>
-              <a:rPr lang="en-IE" dirty="0" smtClean="0"/>
-              <a:t>The number of times you drew a line on the computer screen.  </a:t>
-            </a:r>
-          </a:p>
-          <a:p>
-            <a:pPr lvl="1"/>
-            <a:r>
-              <a:rPr lang="en-IE" dirty="0" smtClean="0"/>
-              <a:t>As each line is drawn, you add one to your counter variable. </a:t>
-            </a:r>
-          </a:p>
-        </p:txBody>
-      </p:sp>
-    </p:spTree>
-    <p:extLst>
-      <p:ext uri="{BB962C8B-B14F-4D97-AF65-F5344CB8AC3E}">
-        <p14:creationId xmlns:p14="http://schemas.microsoft.com/office/powerpoint/2010/main" val="2146369998"/>
-      </p:ext>
-    </p:extLst>
-  </p:cSld>
-  <p:clrMapOvr>
-    <a:masterClrMapping/>
-  </p:clrMapOvr>
-</p:sld>
-</file>
-
-<file path=ppt/slides/slide2.xml><?xml version="1.0" encoding="utf-8"?>
-<p:sld xmlns:a="http://schemas.openxmlformats.org/drawingml/2006/main" xmlns:r="http://schemas.openxmlformats.org/officeDocument/2006/relationships" xmlns:p="http://schemas.openxmlformats.org/presentationml/2006/main">
-  <p:cSld>
-    <p:spTree>
-      <p:nvGrpSpPr>
-        <p:cNvPr id="1" name=""/>
-        <p:cNvGrpSpPr/>
-        <p:nvPr/>
-      </p:nvGrpSpPr>
-      <p:grpSpPr>
-        <a:xfrm>
-          <a:off x="0" y="0"/>
-          <a:ext cx="0" cy="0"/>
-          <a:chOff x="0" y="0"/>
-          <a:chExt cx="0" cy="0"/>
-        </a:xfrm>
-      </p:grpSpPr>
-      <p:sp>
-        <p:nvSpPr>
-          <p:cNvPr id="2" name="Title 1"/>
-          <p:cNvSpPr>
-            <a:spLocks noGrp="1"/>
-          </p:cNvSpPr>
-          <p:nvPr>
-            <p:ph type="title"/>
-          </p:nvPr>
-        </p:nvSpPr>
-        <p:spPr/>
-        <p:txBody>
-          <a:bodyPr/>
-          <a:lstStyle/>
-          <a:p>
-            <a:r>
-              <a:rPr lang="en-IE" smtClean="0"/>
-              <a:t>Topics list</a:t>
-            </a:r>
-            <a:endParaRPr lang="en-IE" dirty="0"/>
-          </a:p>
-        </p:txBody>
-      </p:sp>
-      <p:sp>
-        <p:nvSpPr>
-          <p:cNvPr id="5" name="Content Placeholder 4"/>
-          <p:cNvSpPr>
-            <a:spLocks noGrp="1"/>
-          </p:cNvSpPr>
-          <p:nvPr>
-            <p:ph idx="1"/>
-          </p:nvPr>
-        </p:nvSpPr>
-        <p:spPr>
-          <a:xfrm>
-            <a:off x="457200" y="1600200"/>
-            <a:ext cx="8229600" cy="4525963"/>
-          </a:xfrm>
-        </p:spPr>
-        <p:txBody>
-          <a:bodyPr>
-            <a:normAutofit/>
-          </a:bodyPr>
-          <a:lstStyle/>
-          <a:p>
-            <a:pPr marL="0" indent="0">
-              <a:buNone/>
-            </a:pPr>
-            <a:endParaRPr lang="en-IE" dirty="0" smtClean="0"/>
-          </a:p>
-          <a:p>
-            <a:r>
-              <a:rPr lang="en-IE" dirty="0" smtClean="0"/>
-              <a:t>Mouse Events</a:t>
-            </a:r>
-          </a:p>
-          <a:p>
-            <a:endParaRPr lang="en-IE" dirty="0"/>
-          </a:p>
-          <a:p>
-            <a:r>
-              <a:rPr lang="en-IE" dirty="0" smtClean="0"/>
-              <a:t>Recap: Arithmetic Operators</a:t>
-            </a:r>
-          </a:p>
-          <a:p>
-            <a:endParaRPr lang="en-IE" dirty="0"/>
-          </a:p>
-          <a:p>
-            <a:r>
-              <a:rPr lang="en-IE" dirty="0" smtClean="0"/>
-              <a:t>Order of Evaluation</a:t>
-            </a:r>
-          </a:p>
-        </p:txBody>
-      </p:sp>
-      <p:sp>
-        <p:nvSpPr>
-          <p:cNvPr id="4" name="Rectangle 3"/>
-          <p:cNvSpPr/>
-          <p:nvPr/>
-        </p:nvSpPr>
-        <p:spPr>
-          <a:xfrm>
-            <a:off x="838200" y="2209800"/>
-            <a:ext cx="6096000" cy="533400"/>
-          </a:xfrm>
-          <a:prstGeom prst="rect">
-            <a:avLst/>
-          </a:prstGeom>
-          <a:noFill/>
-          <a:ln>
-            <a:solidFill>
-              <a:srgbClr val="FF0000"/>
-            </a:solidFill>
-          </a:ln>
-        </p:spPr>
-        <p:style>
-          <a:lnRef idx="2">
-            <a:schemeClr val="accent1">
-              <a:shade val="50000"/>
-            </a:schemeClr>
-          </a:lnRef>
-          <a:fillRef idx="1">
-            <a:schemeClr val="accent1"/>
-          </a:fillRef>
-          <a:effectRef idx="0">
-            <a:schemeClr val="accent1"/>
-          </a:effectRef>
-          <a:fontRef idx="minor">
-            <a:schemeClr val="lt1"/>
-          </a:fontRef>
-        </p:style>
-        <p:txBody>
-          <a:bodyPr rtlCol="0" anchor="ctr"/>
-          <a:lstStyle/>
-          <a:p>
-            <a:pPr algn="ctr"/>
-            <a:endParaRPr lang="en-IE"/>
-          </a:p>
-        </p:txBody>
-      </p:sp>
-    </p:spTree>
-    <p:extLst>
-      <p:ext uri="{BB962C8B-B14F-4D97-AF65-F5344CB8AC3E}">
-        <p14:creationId xmlns:p14="http://schemas.microsoft.com/office/powerpoint/2010/main" val="2635913481"/>
-      </p:ext>
-    </p:extLst>
-  </p:cSld>
-  <p:clrMapOvr>
-    <a:masterClrMapping/>
-  </p:clrMapOvr>
-  <p:timing>
-    <p:tnLst>
-      <p:par>
-        <p:cTn id="1" dur="indefinite" restart="never" nodeType="tmRoot"/>
-      </p:par>
-    </p:tnLst>
-  </p:timing>
-</p:sld>
-</file>
-
-<file path=ppt/slides/slide20.xml><?xml version="1.0" encoding="utf-8"?>
-<p:sld xmlns:a="http://schemas.openxmlformats.org/drawingml/2006/main" xmlns:r="http://schemas.openxmlformats.org/officeDocument/2006/relationships" xmlns:p="http://schemas.openxmlformats.org/presentationml/2006/main">
-  <p:cSld>
-    <p:spTree>
-      <p:nvGrpSpPr>
-        <p:cNvPr id="1" name=""/>
-        <p:cNvGrpSpPr/>
-        <p:nvPr/>
-      </p:nvGrpSpPr>
-      <p:grpSpPr>
-        <a:xfrm>
-          <a:off x="0" y="0"/>
-          <a:ext cx="0" cy="0"/>
-          <a:chOff x="0" y="0"/>
-          <a:chExt cx="0" cy="0"/>
-        </a:xfrm>
-      </p:grpSpPr>
-      <p:sp>
-        <p:nvSpPr>
-          <p:cNvPr id="2" name="Title 1"/>
-          <p:cNvSpPr>
-            <a:spLocks noGrp="1"/>
-          </p:cNvSpPr>
-          <p:nvPr>
-            <p:ph type="title"/>
-          </p:nvPr>
-        </p:nvSpPr>
-        <p:spPr/>
-        <p:txBody>
-          <a:bodyPr/>
-          <a:lstStyle/>
-          <a:p>
-            <a:r>
-              <a:rPr lang="en-IE" dirty="0" smtClean="0"/>
-              <a:t>Arithmetic Operators</a:t>
-            </a:r>
-            <a:endParaRPr lang="en-IE" dirty="0"/>
-          </a:p>
-        </p:txBody>
-      </p:sp>
-      <p:sp>
-        <p:nvSpPr>
-          <p:cNvPr id="3" name="Content Placeholder 2"/>
-          <p:cNvSpPr>
-            <a:spLocks noGrp="1"/>
-          </p:cNvSpPr>
-          <p:nvPr>
-            <p:ph idx="1"/>
-          </p:nvPr>
-        </p:nvSpPr>
-        <p:spPr>
-          <a:xfrm>
-            <a:off x="457200" y="1600200"/>
-            <a:ext cx="5867400" cy="4525963"/>
-          </a:xfrm>
-        </p:spPr>
-        <p:style>
-          <a:lnRef idx="1">
-            <a:schemeClr val="accent6"/>
-          </a:lnRef>
-          <a:fillRef idx="2">
-            <a:schemeClr val="accent6"/>
-          </a:fillRef>
-          <a:effectRef idx="1">
-            <a:schemeClr val="accent6"/>
-          </a:effectRef>
-          <a:fontRef idx="minor">
-            <a:schemeClr val="dk1"/>
-          </a:fontRef>
-        </p:style>
-        <p:txBody>
-          <a:bodyPr>
-            <a:normAutofit lnSpcReduction="10000"/>
-          </a:bodyPr>
-          <a:lstStyle/>
-          <a:p>
-            <a:pPr marL="0" indent="0">
-              <a:buNone/>
-            </a:pPr>
-            <a:r>
-              <a:rPr lang="en-IE" b="1" dirty="0" err="1">
-                <a:solidFill>
-                  <a:schemeClr val="tx1"/>
-                </a:solidFill>
-              </a:rPr>
-              <a:t>int</a:t>
-            </a:r>
-            <a:r>
-              <a:rPr lang="en-IE" b="1" dirty="0">
-                <a:solidFill>
-                  <a:schemeClr val="tx1"/>
-                </a:solidFill>
-              </a:rPr>
-              <a:t> counter = 0;</a:t>
-            </a:r>
-          </a:p>
-          <a:p>
-            <a:pPr marL="0" indent="0">
-              <a:buNone/>
-            </a:pPr>
-            <a:endParaRPr lang="en-IE" dirty="0">
-              <a:solidFill>
-                <a:schemeClr val="tx1"/>
-              </a:solidFill>
-            </a:endParaRPr>
-          </a:p>
-          <a:p>
-            <a:pPr marL="0" indent="0">
-              <a:buNone/>
-            </a:pPr>
-            <a:r>
-              <a:rPr lang="en-IE" dirty="0">
-                <a:solidFill>
-                  <a:schemeClr val="tx1"/>
-                </a:solidFill>
-              </a:rPr>
-              <a:t>void draw()</a:t>
-            </a:r>
-          </a:p>
-          <a:p>
-            <a:pPr marL="0" indent="0">
-              <a:buNone/>
-            </a:pPr>
-            <a:r>
-              <a:rPr lang="en-IE" dirty="0">
-                <a:solidFill>
-                  <a:schemeClr val="tx1"/>
-                </a:solidFill>
-              </a:rPr>
-              <a:t>{</a:t>
-            </a:r>
-          </a:p>
-          <a:p>
-            <a:pPr marL="0" indent="0">
-              <a:buNone/>
-            </a:pPr>
-            <a:r>
-              <a:rPr lang="en-IE" dirty="0">
-                <a:solidFill>
-                  <a:schemeClr val="tx1"/>
-                </a:solidFill>
-              </a:rPr>
-              <a:t>  line (</a:t>
-            </a:r>
-            <a:r>
-              <a:rPr lang="en-IE" dirty="0" err="1">
-                <a:solidFill>
-                  <a:schemeClr val="tx1"/>
-                </a:solidFill>
-              </a:rPr>
-              <a:t>mouseX</a:t>
-            </a:r>
-            <a:r>
-              <a:rPr lang="en-IE" dirty="0">
-                <a:solidFill>
-                  <a:schemeClr val="tx1"/>
-                </a:solidFill>
-              </a:rPr>
-              <a:t>, </a:t>
-            </a:r>
-            <a:r>
-              <a:rPr lang="en-IE" dirty="0" err="1">
-                <a:solidFill>
-                  <a:schemeClr val="tx1"/>
-                </a:solidFill>
-              </a:rPr>
-              <a:t>mouseY</a:t>
-            </a:r>
-            <a:r>
-              <a:rPr lang="en-IE" dirty="0">
-                <a:solidFill>
-                  <a:schemeClr val="tx1"/>
-                </a:solidFill>
-              </a:rPr>
-              <a:t>, 50,50);</a:t>
-            </a:r>
-          </a:p>
-          <a:p>
-            <a:pPr marL="0" indent="0">
-              <a:buNone/>
-            </a:pPr>
-            <a:r>
-              <a:rPr lang="en-IE" b="1" dirty="0">
-                <a:solidFill>
-                  <a:schemeClr val="tx1"/>
-                </a:solidFill>
-              </a:rPr>
-              <a:t>  counter = counter + 1;</a:t>
-            </a:r>
-          </a:p>
-          <a:p>
-            <a:pPr marL="0" indent="0">
-              <a:buNone/>
-            </a:pPr>
-            <a:r>
-              <a:rPr lang="en-IE" dirty="0"/>
-              <a:t>  </a:t>
-            </a:r>
-            <a:r>
-              <a:rPr lang="en-IE" dirty="0" err="1" smtClean="0"/>
-              <a:t>println</a:t>
-            </a:r>
-            <a:r>
-              <a:rPr lang="en-IE" dirty="0" smtClean="0"/>
-              <a:t> </a:t>
-            </a:r>
-            <a:r>
-              <a:rPr lang="en-IE" dirty="0"/>
-              <a:t>(</a:t>
-            </a:r>
-            <a:r>
-              <a:rPr lang="en-IE" dirty="0" smtClean="0"/>
-              <a:t>counter);</a:t>
-            </a:r>
-            <a:endParaRPr lang="en-IE" dirty="0"/>
-          </a:p>
-          <a:p>
-            <a:pPr marL="0" indent="0">
-              <a:buNone/>
-            </a:pPr>
-            <a:r>
-              <a:rPr lang="en-IE" dirty="0"/>
-              <a:t>}</a:t>
-            </a:r>
-            <a:endParaRPr lang="en-IE" dirty="0" smtClean="0"/>
-          </a:p>
-        </p:txBody>
-      </p:sp>
-    </p:spTree>
-    <p:extLst>
-      <p:ext uri="{BB962C8B-B14F-4D97-AF65-F5344CB8AC3E}">
-        <p14:creationId xmlns:p14="http://schemas.microsoft.com/office/powerpoint/2010/main" val="2333356852"/>
-      </p:ext>
-    </p:extLst>
-  </p:cSld>
-  <p:clrMapOvr>
-    <a:masterClrMapping/>
-  </p:clrMapOvr>
-</p:sld>
-</file>
-
-<file path=ppt/slides/slide21.xml><?xml version="1.0" encoding="utf-8"?>
-<p:sld xmlns:a="http://schemas.openxmlformats.org/drawingml/2006/main" xmlns:r="http://schemas.openxmlformats.org/officeDocument/2006/relationships" xmlns:p="http://schemas.openxmlformats.org/presentationml/2006/main">
-  <p:cSld>
-    <p:spTree>
-      <p:nvGrpSpPr>
-        <p:cNvPr id="1" name=""/>
-        <p:cNvGrpSpPr/>
-        <p:nvPr/>
-      </p:nvGrpSpPr>
-      <p:grpSpPr>
-        <a:xfrm>
-          <a:off x="0" y="0"/>
-          <a:ext cx="0" cy="0"/>
-          <a:chOff x="0" y="0"/>
-          <a:chExt cx="0" cy="0"/>
-        </a:xfrm>
-      </p:grpSpPr>
-      <p:sp>
-        <p:nvSpPr>
-          <p:cNvPr id="2" name="Title 1"/>
-          <p:cNvSpPr>
-            <a:spLocks noGrp="1"/>
-          </p:cNvSpPr>
-          <p:nvPr>
-            <p:ph type="title"/>
-          </p:nvPr>
-        </p:nvSpPr>
-        <p:spPr/>
-        <p:txBody>
-          <a:bodyPr/>
-          <a:lstStyle/>
-          <a:p>
-            <a:r>
-              <a:rPr lang="en-IE" dirty="0" smtClean="0"/>
-              <a:t>Arithmetic Operators</a:t>
-            </a:r>
-            <a:endParaRPr lang="en-IE" dirty="0"/>
-          </a:p>
-        </p:txBody>
-      </p:sp>
-      <p:sp>
-        <p:nvSpPr>
-          <p:cNvPr id="3" name="Content Placeholder 2"/>
-          <p:cNvSpPr>
-            <a:spLocks noGrp="1"/>
-          </p:cNvSpPr>
-          <p:nvPr>
-            <p:ph idx="1"/>
-          </p:nvPr>
-        </p:nvSpPr>
-        <p:spPr/>
-        <p:txBody>
-          <a:bodyPr/>
-          <a:lstStyle/>
-          <a:p>
-            <a:r>
-              <a:rPr lang="en-IE" dirty="0" smtClean="0"/>
-              <a:t>These examples are straightforward uses of the arithmetic operators.</a:t>
-            </a:r>
-          </a:p>
-          <a:p>
-            <a:r>
-              <a:rPr lang="en-IE" dirty="0" smtClean="0"/>
-              <a:t>However, we typically want to do more complex calculations involving many arithmetic operators.</a:t>
-            </a:r>
-          </a:p>
-          <a:p>
-            <a:r>
-              <a:rPr lang="en-IE" dirty="0" smtClean="0"/>
-              <a:t>To do this, we need to understand the </a:t>
-            </a:r>
-            <a:r>
-              <a:rPr lang="en-IE" b="1" dirty="0" smtClean="0"/>
-              <a:t>Order of Evaluation.</a:t>
-            </a:r>
-          </a:p>
-        </p:txBody>
-      </p:sp>
-    </p:spTree>
-    <p:extLst>
-      <p:ext uri="{BB962C8B-B14F-4D97-AF65-F5344CB8AC3E}">
-        <p14:creationId xmlns:p14="http://schemas.microsoft.com/office/powerpoint/2010/main" val="1295207290"/>
-      </p:ext>
-    </p:extLst>
-  </p:cSld>
-  <p:clrMapOvr>
-    <a:masterClrMapping/>
-  </p:clrMapOvr>
-</p:sld>
-</file>
-
-<file path=ppt/slides/slide22.xml><?xml version="1.0" encoding="utf-8"?>
-<p:sld xmlns:a="http://schemas.openxmlformats.org/drawingml/2006/main" xmlns:r="http://schemas.openxmlformats.org/officeDocument/2006/relationships" xmlns:p="http://schemas.openxmlformats.org/presentationml/2006/main">
-  <p:cSld>
-    <p:spTree>
-      <p:nvGrpSpPr>
-        <p:cNvPr id="1" name=""/>
-        <p:cNvGrpSpPr/>
-        <p:nvPr/>
-      </p:nvGrpSpPr>
-      <p:grpSpPr>
-        <a:xfrm>
-          <a:off x="0" y="0"/>
-          <a:ext cx="0" cy="0"/>
-          <a:chOff x="0" y="0"/>
-          <a:chExt cx="0" cy="0"/>
-        </a:xfrm>
-      </p:grpSpPr>
-      <p:sp>
-        <p:nvSpPr>
-          <p:cNvPr id="2" name="Title 1"/>
-          <p:cNvSpPr>
-            <a:spLocks noGrp="1"/>
-          </p:cNvSpPr>
-          <p:nvPr>
-            <p:ph type="title"/>
-          </p:nvPr>
-        </p:nvSpPr>
-        <p:spPr/>
-        <p:txBody>
-          <a:bodyPr/>
-          <a:lstStyle/>
-          <a:p>
-            <a:r>
-              <a:rPr lang="en-IE" smtClean="0"/>
-              <a:t>Topics list</a:t>
-            </a:r>
-            <a:endParaRPr lang="en-IE" dirty="0"/>
-          </a:p>
-        </p:txBody>
-      </p:sp>
-      <p:sp>
-        <p:nvSpPr>
-          <p:cNvPr id="5" name="Content Placeholder 4"/>
-          <p:cNvSpPr>
-            <a:spLocks noGrp="1"/>
-          </p:cNvSpPr>
-          <p:nvPr>
-            <p:ph idx="1"/>
-          </p:nvPr>
-        </p:nvSpPr>
-        <p:spPr>
-          <a:xfrm>
-            <a:off x="457200" y="1600200"/>
-            <a:ext cx="8229600" cy="4525963"/>
-          </a:xfrm>
-        </p:spPr>
-        <p:txBody>
-          <a:bodyPr>
-            <a:normAutofit/>
-          </a:bodyPr>
-          <a:lstStyle/>
-          <a:p>
-            <a:pPr marL="0" indent="0">
-              <a:buNone/>
-            </a:pPr>
-            <a:endParaRPr lang="en-IE" dirty="0" smtClean="0"/>
-          </a:p>
-          <a:p>
-            <a:r>
-              <a:rPr lang="en-IE" dirty="0" smtClean="0"/>
-              <a:t>Mouse Events</a:t>
-            </a:r>
-          </a:p>
-          <a:p>
-            <a:endParaRPr lang="en-IE" dirty="0"/>
-          </a:p>
-          <a:p>
-            <a:r>
-              <a:rPr lang="en-IE" dirty="0" smtClean="0"/>
-              <a:t>Recap: Arithmetic Operators</a:t>
-            </a:r>
-          </a:p>
-          <a:p>
-            <a:endParaRPr lang="en-IE" dirty="0"/>
-          </a:p>
-          <a:p>
-            <a:r>
-              <a:rPr lang="en-IE" dirty="0" smtClean="0"/>
-              <a:t>Order of Evaluation</a:t>
-            </a:r>
-          </a:p>
-        </p:txBody>
-      </p:sp>
-      <p:sp>
-        <p:nvSpPr>
-          <p:cNvPr id="4" name="Rectangle 3"/>
-          <p:cNvSpPr/>
-          <p:nvPr/>
-        </p:nvSpPr>
-        <p:spPr>
-          <a:xfrm>
-            <a:off x="838200" y="4572000"/>
-            <a:ext cx="6096000" cy="533400"/>
-          </a:xfrm>
-          <a:prstGeom prst="rect">
-            <a:avLst/>
-          </a:prstGeom>
-          <a:noFill/>
-          <a:ln>
-            <a:solidFill>
-              <a:srgbClr val="FF0000"/>
-            </a:solidFill>
-          </a:ln>
-        </p:spPr>
-        <p:style>
-          <a:lnRef idx="2">
-            <a:schemeClr val="accent1">
-              <a:shade val="50000"/>
-            </a:schemeClr>
-          </a:lnRef>
-          <a:fillRef idx="1">
-            <a:schemeClr val="accent1"/>
-          </a:fillRef>
-          <a:effectRef idx="0">
-            <a:schemeClr val="accent1"/>
-          </a:effectRef>
-          <a:fontRef idx="minor">
-            <a:schemeClr val="lt1"/>
-          </a:fontRef>
-        </p:style>
-        <p:txBody>
-          <a:bodyPr rtlCol="0" anchor="ctr"/>
-          <a:lstStyle/>
-          <a:p>
-            <a:pPr algn="ctr"/>
-            <a:endParaRPr lang="en-IE"/>
-          </a:p>
-        </p:txBody>
-      </p:sp>
-    </p:spTree>
-    <p:extLst>
-      <p:ext uri="{BB962C8B-B14F-4D97-AF65-F5344CB8AC3E}">
-        <p14:creationId xmlns:p14="http://schemas.microsoft.com/office/powerpoint/2010/main" val="145953641"/>
-      </p:ext>
-    </p:extLst>
-  </p:cSld>
-  <p:clrMapOvr>
-    <a:masterClrMapping/>
-  </p:clrMapOvr>
-  <p:timing>
-    <p:tnLst>
-      <p:par>
-        <p:cTn id="1" dur="indefinite" restart="never" nodeType="tmRoot"/>
-      </p:par>
-    </p:tnLst>
-  </p:timing>
-</p:sld>
-</file>
-
-<file path=ppt/slides/slide23.xml><?xml version="1.0" encoding="utf-8"?>
-<p:sld xmlns:a="http://schemas.openxmlformats.org/drawingml/2006/main" xmlns:r="http://schemas.openxmlformats.org/officeDocument/2006/relationships" xmlns:p="http://schemas.openxmlformats.org/presentationml/2006/main">
-  <p:cSld>
-    <p:spTree>
-      <p:nvGrpSpPr>
-        <p:cNvPr id="1" name=""/>
-        <p:cNvGrpSpPr/>
-        <p:nvPr/>
-      </p:nvGrpSpPr>
-      <p:grpSpPr>
-        <a:xfrm>
-          <a:off x="0" y="0"/>
-          <a:ext cx="0" cy="0"/>
-          <a:chOff x="0" y="0"/>
-          <a:chExt cx="0" cy="0"/>
-        </a:xfrm>
-      </p:grpSpPr>
-      <p:sp>
-        <p:nvSpPr>
-          <p:cNvPr id="2" name="Title 1"/>
-          <p:cNvSpPr>
-            <a:spLocks noGrp="1"/>
-          </p:cNvSpPr>
-          <p:nvPr>
-            <p:ph type="title"/>
-          </p:nvPr>
-        </p:nvSpPr>
-        <p:spPr/>
-        <p:txBody>
-          <a:bodyPr/>
-          <a:lstStyle/>
-          <a:p>
-            <a:r>
-              <a:rPr lang="en-IE" dirty="0" smtClean="0"/>
-              <a:t>Order of Evaluation</a:t>
-            </a:r>
-            <a:endParaRPr lang="en-IE" dirty="0"/>
-          </a:p>
-        </p:txBody>
-      </p:sp>
-      <p:sp>
-        <p:nvSpPr>
-          <p:cNvPr id="3" name="Content Placeholder 2"/>
-          <p:cNvSpPr>
-            <a:spLocks noGrp="1"/>
-          </p:cNvSpPr>
-          <p:nvPr>
-            <p:ph idx="1"/>
-          </p:nvPr>
-        </p:nvSpPr>
-        <p:spPr/>
-        <p:txBody>
-          <a:bodyPr>
-            <a:normAutofit lnSpcReduction="10000"/>
-          </a:bodyPr>
-          <a:lstStyle/>
-          <a:p>
-            <a:r>
-              <a:rPr lang="en-IE" dirty="0" smtClean="0"/>
-              <a:t>Brackets ()</a:t>
-            </a:r>
-          </a:p>
-          <a:p>
-            <a:r>
-              <a:rPr lang="en-IE" dirty="0" smtClean="0"/>
-              <a:t>Multiplication (*)</a:t>
-            </a:r>
-          </a:p>
-          <a:p>
-            <a:r>
-              <a:rPr lang="en-IE" dirty="0" smtClean="0"/>
-              <a:t>Division (/)</a:t>
-            </a:r>
-          </a:p>
-          <a:p>
-            <a:r>
-              <a:rPr lang="en-IE" dirty="0" smtClean="0"/>
-              <a:t>Addition (+)</a:t>
-            </a:r>
-          </a:p>
-          <a:p>
-            <a:r>
-              <a:rPr lang="en-IE" dirty="0" smtClean="0"/>
-              <a:t>Subtraction (-)</a:t>
-            </a:r>
-          </a:p>
-          <a:p>
-            <a:endParaRPr lang="en-IE" dirty="0"/>
-          </a:p>
-          <a:p>
-            <a:pPr marL="0" indent="0" algn="ctr">
-              <a:buNone/>
-            </a:pPr>
-            <a:r>
-              <a:rPr lang="en-IE" dirty="0" err="1">
-                <a:solidFill>
-                  <a:srgbClr val="FF0000"/>
-                </a:solidFill>
-              </a:rPr>
-              <a:t>B</a:t>
-            </a:r>
-            <a:r>
-              <a:rPr lang="en-IE" dirty="0" err="1"/>
-              <a:t>o</a:t>
-            </a:r>
-            <a:r>
-              <a:rPr lang="en-IE" dirty="0" err="1">
-                <a:solidFill>
-                  <a:srgbClr val="FF0000"/>
-                </a:solidFill>
-              </a:rPr>
-              <a:t>MDAS</a:t>
-            </a:r>
-            <a:endParaRPr lang="en-IE" dirty="0">
-              <a:solidFill>
-                <a:srgbClr val="FF0000"/>
-              </a:solidFill>
-            </a:endParaRPr>
-          </a:p>
-          <a:p>
-            <a:pPr marL="0" indent="0" algn="ctr">
-              <a:buNone/>
-            </a:pPr>
-            <a:r>
-              <a:rPr lang="en-IE" dirty="0">
-                <a:solidFill>
-                  <a:srgbClr val="FF0000"/>
-                </a:solidFill>
-              </a:rPr>
-              <a:t>B</a:t>
-            </a:r>
-            <a:r>
-              <a:rPr lang="en-IE" dirty="0"/>
-              <a:t>eware </a:t>
-            </a:r>
-            <a:r>
-              <a:rPr lang="en-IE" dirty="0">
-                <a:solidFill>
-                  <a:srgbClr val="FF0000"/>
-                </a:solidFill>
-              </a:rPr>
-              <a:t>M</a:t>
-            </a:r>
-            <a:r>
-              <a:rPr lang="en-IE" dirty="0"/>
-              <a:t>y </a:t>
-            </a:r>
-            <a:r>
-              <a:rPr lang="en-IE" dirty="0">
-                <a:solidFill>
-                  <a:srgbClr val="FF0000"/>
-                </a:solidFill>
-              </a:rPr>
-              <a:t>D</a:t>
-            </a:r>
-            <a:r>
-              <a:rPr lang="en-IE" dirty="0"/>
-              <a:t>ear </a:t>
-            </a:r>
-            <a:r>
-              <a:rPr lang="en-IE" dirty="0">
-                <a:solidFill>
-                  <a:srgbClr val="FF0000"/>
-                </a:solidFill>
-              </a:rPr>
-              <a:t>A</a:t>
-            </a:r>
-            <a:r>
-              <a:rPr lang="en-IE" dirty="0"/>
-              <a:t>unt </a:t>
-            </a:r>
-            <a:r>
-              <a:rPr lang="en-IE" dirty="0">
-                <a:solidFill>
-                  <a:srgbClr val="FF0000"/>
-                </a:solidFill>
-              </a:rPr>
-              <a:t>S</a:t>
-            </a:r>
-            <a:r>
-              <a:rPr lang="en-IE" dirty="0"/>
-              <a:t>ally</a:t>
-            </a:r>
-          </a:p>
-        </p:txBody>
-      </p:sp>
-    </p:spTree>
-    <p:extLst>
-      <p:ext uri="{BB962C8B-B14F-4D97-AF65-F5344CB8AC3E}">
-        <p14:creationId xmlns:p14="http://schemas.microsoft.com/office/powerpoint/2010/main" val="3335249688"/>
-      </p:ext>
-    </p:extLst>
-  </p:cSld>
-  <p:clrMapOvr>
-    <a:masterClrMapping/>
-  </p:clrMapOvr>
-</p:sld>
-</file>
-
-<file path=ppt/slides/slide24.xml><?xml version="1.0" encoding="utf-8"?>
-<p:sld xmlns:a="http://schemas.openxmlformats.org/drawingml/2006/main" xmlns:r="http://schemas.openxmlformats.org/officeDocument/2006/relationships" xmlns:p="http://schemas.openxmlformats.org/presentationml/2006/main">
-  <p:cSld>
-    <p:spTree>
-      <p:nvGrpSpPr>
-        <p:cNvPr id="1" name=""/>
-        <p:cNvGrpSpPr/>
-        <p:nvPr/>
-      </p:nvGrpSpPr>
-      <p:grpSpPr>
-        <a:xfrm>
-          <a:off x="0" y="0"/>
-          <a:ext cx="0" cy="0"/>
-          <a:chOff x="0" y="0"/>
-          <a:chExt cx="0" cy="0"/>
-        </a:xfrm>
-      </p:grpSpPr>
-      <p:sp>
-        <p:nvSpPr>
-          <p:cNvPr id="2" name="Title 1"/>
-          <p:cNvSpPr>
-            <a:spLocks noGrp="1"/>
-          </p:cNvSpPr>
-          <p:nvPr>
-            <p:ph type="title"/>
-          </p:nvPr>
-        </p:nvSpPr>
-        <p:spPr/>
-        <p:txBody>
-          <a:bodyPr/>
-          <a:lstStyle/>
-          <a:p>
-            <a:r>
-              <a:rPr lang="en-IE" dirty="0" smtClean="0"/>
-              <a:t>Order of Evaluation - Quiz</a:t>
-            </a:r>
-            <a:endParaRPr lang="en-IE" dirty="0"/>
-          </a:p>
-        </p:txBody>
-      </p:sp>
-      <p:sp>
-        <p:nvSpPr>
-          <p:cNvPr id="3" name="Content Placeholder 2"/>
-          <p:cNvSpPr>
-            <a:spLocks noGrp="1"/>
-          </p:cNvSpPr>
-          <p:nvPr>
-            <p:ph idx="1"/>
-          </p:nvPr>
-        </p:nvSpPr>
-        <p:spPr/>
-        <p:txBody>
-          <a:bodyPr>
-            <a:normAutofit/>
-          </a:bodyPr>
-          <a:lstStyle/>
-          <a:p>
-            <a:pPr marL="0" indent="0">
-              <a:buNone/>
-            </a:pPr>
-            <a:r>
-              <a:rPr lang="en-IE" dirty="0" smtClean="0"/>
-              <a:t>What are the results of these calculations?</a:t>
-            </a:r>
-          </a:p>
-          <a:p>
-            <a:pPr marL="0" indent="0">
-              <a:buNone/>
-            </a:pPr>
-            <a:endParaRPr lang="en-IE" dirty="0"/>
-          </a:p>
-          <a:p>
-            <a:pPr marL="0" indent="0">
-              <a:buNone/>
-            </a:pPr>
-            <a:r>
-              <a:rPr lang="en-IE" dirty="0" smtClean="0"/>
-              <a:t>	Q1: 		3+6*5-2</a:t>
-            </a:r>
-          </a:p>
-          <a:p>
-            <a:pPr marL="0" indent="0">
-              <a:buNone/>
-            </a:pPr>
-            <a:r>
-              <a:rPr lang="en-IE" dirty="0" smtClean="0"/>
-              <a:t>	Q2</a:t>
-            </a:r>
-            <a:r>
-              <a:rPr lang="en-IE" dirty="0"/>
-              <a:t>:		3+6</a:t>
-            </a:r>
-            <a:r>
-              <a:rPr lang="en-IE" dirty="0" smtClean="0"/>
-              <a:t>*(5-2)</a:t>
-            </a:r>
-          </a:p>
-          <a:p>
-            <a:pPr marL="0" indent="0">
-              <a:buNone/>
-            </a:pPr>
-            <a:r>
-              <a:rPr lang="en-IE" dirty="0" smtClean="0"/>
-              <a:t>	Q3</a:t>
-            </a:r>
-            <a:r>
-              <a:rPr lang="en-IE" dirty="0"/>
-              <a:t>:		</a:t>
-            </a:r>
-            <a:r>
-              <a:rPr lang="en-IE" dirty="0" smtClean="0"/>
-              <a:t>(3+6)*5-2</a:t>
-            </a:r>
-          </a:p>
-          <a:p>
-            <a:pPr marL="0" indent="0">
-              <a:buNone/>
-            </a:pPr>
-            <a:endParaRPr lang="en-IE" dirty="0"/>
-          </a:p>
-        </p:txBody>
-      </p:sp>
-    </p:spTree>
-    <p:extLst>
-      <p:ext uri="{BB962C8B-B14F-4D97-AF65-F5344CB8AC3E}">
-        <p14:creationId xmlns:p14="http://schemas.microsoft.com/office/powerpoint/2010/main" val="3443294678"/>
-      </p:ext>
-    </p:extLst>
-  </p:cSld>
-  <p:clrMapOvr>
-    <a:masterClrMapping/>
-  </p:clrMapOvr>
-</p:sld>
-</file>
-
-<file path=ppt/slides/slide25.xml><?xml version="1.0" encoding="utf-8"?>
+<file path=ppt/slides/slide14.xml><?xml version="1.0" encoding="utf-8"?>
 <p:sld xmlns:a="http://schemas.openxmlformats.org/drawingml/2006/main" xmlns:r="http://schemas.openxmlformats.org/officeDocument/2006/relationships" xmlns:p="http://schemas.openxmlformats.org/presentationml/2006/main">
   <p:cSld>
     <p:spTree>
@@ -9451,7 +5943,7 @@
 </p:sld>
 </file>
 
-<file path=ppt/slides/slide26.xml><?xml version="1.0" encoding="utf-8"?>
+<file path=ppt/slides/slide15.xml><?xml version="1.0" encoding="utf-8"?>
 <p:sld xmlns:a="http://schemas.openxmlformats.org/drawingml/2006/main" xmlns:r="http://schemas.openxmlformats.org/officeDocument/2006/relationships" xmlns:p="http://schemas.openxmlformats.org/presentationml/2006/main">
   <p:cSld>
     <p:spTree>
@@ -9541,7 +6033,7 @@
 </p:sld>
 </file>
 
-<file path=ppt/slides/slide27.xml><?xml version="1.0" encoding="utf-8"?>
+<file path=ppt/slides/slide16.xml><?xml version="1.0" encoding="utf-8"?>
 <p:sld xmlns:a="http://schemas.openxmlformats.org/drawingml/2006/main" xmlns:r="http://schemas.openxmlformats.org/officeDocument/2006/relationships" xmlns:p="http://schemas.openxmlformats.org/presentationml/2006/main">
   <p:cSld>
     <p:spTree>
@@ -9710,7 +6202,7 @@
 </p:sld>
 </file>
 
-<file path=ppt/slides/slide3.xml><?xml version="1.0" encoding="utf-8"?>
+<file path=ppt/slides/slide2.xml><?xml version="1.0" encoding="utf-8"?>
 <p:sld xmlns:a="http://schemas.openxmlformats.org/drawingml/2006/main" xmlns:r="http://schemas.openxmlformats.org/officeDocument/2006/relationships" xmlns:p="http://schemas.openxmlformats.org/presentationml/2006/main">
   <p:cSld>
     <p:spTree>
@@ -9851,7 +6343,7 @@
 </p:sld>
 </file>
 
-<file path=ppt/slides/slide4.xml><?xml version="1.0" encoding="utf-8"?>
+<file path=ppt/slides/slide3.xml><?xml version="1.0" encoding="utf-8"?>
 <p:sld xmlns:a="http://schemas.openxmlformats.org/drawingml/2006/main" xmlns:r="http://schemas.openxmlformats.org/officeDocument/2006/relationships" xmlns:p="http://schemas.openxmlformats.org/presentationml/2006/main">
   <p:cSld>
     <p:spTree>
@@ -10385,7 +6877,7 @@
 </p:sld>
 </file>
 
-<file path=ppt/slides/slide5.xml><?xml version="1.0" encoding="utf-8"?>
+<file path=ppt/slides/slide4.xml><?xml version="1.0" encoding="utf-8"?>
 <p:sld xmlns:a="http://schemas.openxmlformats.org/drawingml/2006/main" xmlns:r="http://schemas.openxmlformats.org/officeDocument/2006/relationships" xmlns:p="http://schemas.openxmlformats.org/presentationml/2006/main">
   <p:cSld>
     <p:spTree>
@@ -10511,7 +7003,7 @@
 </p:sld>
 </file>
 
-<file path=ppt/slides/slide6.xml><?xml version="1.0" encoding="utf-8"?>
+<file path=ppt/slides/slide5.xml><?xml version="1.0" encoding="utf-8"?>
 <p:sld xmlns:a="http://schemas.openxmlformats.org/drawingml/2006/main" xmlns:r="http://schemas.openxmlformats.org/officeDocument/2006/relationships" xmlns:p="http://schemas.openxmlformats.org/presentationml/2006/main">
   <p:cSld>
     <p:spTree>
@@ -10738,7 +7230,7 @@
 </p:sld>
 </file>
 
-<file path=ppt/slides/slide7.xml><?xml version="1.0" encoding="utf-8"?>
+<file path=ppt/slides/slide6.xml><?xml version="1.0" encoding="utf-8"?>
 <p:sld xmlns:a="http://schemas.openxmlformats.org/drawingml/2006/main" xmlns:r="http://schemas.openxmlformats.org/officeDocument/2006/relationships" xmlns:p="http://schemas.openxmlformats.org/presentationml/2006/main">
   <p:cSld>
     <p:spTree>
@@ -11337,7 +7829,7 @@
 </p:sld>
 </file>
 
-<file path=ppt/slides/slide8.xml><?xml version="1.0" encoding="utf-8"?>
+<file path=ppt/slides/slide7.xml><?xml version="1.0" encoding="utf-8"?>
 <p:sld xmlns:a="http://schemas.openxmlformats.org/drawingml/2006/main" xmlns:r="http://schemas.openxmlformats.org/officeDocument/2006/relationships" xmlns:p="http://schemas.openxmlformats.org/presentationml/2006/main">
   <p:cSld>
     <p:spTree>
@@ -11539,7 +8031,7 @@
 </p:sld>
 </file>
 
-<file path=ppt/slides/slide9.xml><?xml version="1.0" encoding="utf-8"?>
+<file path=ppt/slides/slide8.xml><?xml version="1.0" encoding="utf-8"?>
 <p:sld xmlns:a="http://schemas.openxmlformats.org/drawingml/2006/main" xmlns:r="http://schemas.openxmlformats.org/officeDocument/2006/relationships" xmlns:p="http://schemas.openxmlformats.org/presentationml/2006/main">
   <p:cSld>
     <p:spTree>
@@ -12094,6 +8586,325 @@
     <p:extLst>
       <p:ext uri="{BB962C8B-B14F-4D97-AF65-F5344CB8AC3E}">
         <p14:creationId xmlns:p14="http://schemas.microsoft.com/office/powerpoint/2010/main" val="4087767306"/>
+      </p:ext>
+    </p:extLst>
+  </p:cSld>
+  <p:clrMapOvr>
+    <a:masterClrMapping/>
+  </p:clrMapOvr>
+</p:sld>
+</file>
+
+<file path=ppt/slides/slide9.xml><?xml version="1.0" encoding="utf-8"?>
+<p:sld xmlns:a="http://schemas.openxmlformats.org/drawingml/2006/main" xmlns:r="http://schemas.openxmlformats.org/officeDocument/2006/relationships" xmlns:p="http://schemas.openxmlformats.org/presentationml/2006/main">
+  <p:cSld>
+    <p:spTree>
+      <p:nvGrpSpPr>
+        <p:cNvPr id="1" name=""/>
+        <p:cNvGrpSpPr/>
+        <p:nvPr/>
+      </p:nvGrpSpPr>
+      <p:grpSpPr>
+        <a:xfrm>
+          <a:off x="0" y="0"/>
+          <a:ext cx="0" cy="0"/>
+          <a:chOff x="0" y="0"/>
+          <a:chExt cx="0" cy="0"/>
+        </a:xfrm>
+      </p:grpSpPr>
+      <p:sp>
+        <p:nvSpPr>
+          <p:cNvPr id="2" name="Title 1"/>
+          <p:cNvSpPr>
+            <a:spLocks noGrp="1"/>
+          </p:cNvSpPr>
+          <p:nvPr>
+            <p:ph type="title"/>
+          </p:nvPr>
+        </p:nvSpPr>
+        <p:spPr/>
+        <p:txBody>
+          <a:bodyPr>
+            <a:normAutofit/>
+          </a:bodyPr>
+          <a:lstStyle/>
+          <a:p>
+            <a:r>
+              <a:rPr lang="en-IE" dirty="0" smtClean="0"/>
+              <a:t>Processing Example 5.3</a:t>
+            </a:r>
+            <a:endParaRPr lang="en-IE" dirty="0"/>
+          </a:p>
+        </p:txBody>
+      </p:sp>
+      <p:sp>
+        <p:nvSpPr>
+          <p:cNvPr id="3" name="Content Placeholder 2"/>
+          <p:cNvSpPr>
+            <a:spLocks noGrp="1"/>
+          </p:cNvSpPr>
+          <p:nvPr>
+            <p:ph idx="1"/>
+          </p:nvPr>
+        </p:nvSpPr>
+        <p:spPr>
+          <a:xfrm>
+            <a:off x="457199" y="1600200"/>
+            <a:ext cx="6606493" cy="4525963"/>
+          </a:xfrm>
+        </p:spPr>
+        <p:txBody>
+          <a:bodyPr>
+            <a:normAutofit fontScale="85000" lnSpcReduction="20000"/>
+          </a:bodyPr>
+          <a:lstStyle/>
+          <a:p>
+            <a:r>
+              <a:rPr lang="en-IE" dirty="0" smtClean="0"/>
+              <a:t>Functionality:</a:t>
+            </a:r>
+          </a:p>
+          <a:p>
+            <a:pPr marL="0" indent="0">
+              <a:buNone/>
+            </a:pPr>
+            <a:endParaRPr lang="en-IE" sz="1500" dirty="0" smtClean="0"/>
+          </a:p>
+          <a:p>
+            <a:pPr lvl="1"/>
+            <a:r>
+              <a:rPr lang="en-IE" dirty="0" smtClean="0"/>
+              <a:t>If the LEFT button on the mouse is pressed, set the fill to black and draw a square.  As soon as the LEFT button is released, </a:t>
+            </a:r>
+            <a:r>
+              <a:rPr lang="en-IE" dirty="0" err="1" smtClean="0"/>
+              <a:t>gray</a:t>
+            </a:r>
+            <a:r>
+              <a:rPr lang="en-IE" dirty="0" smtClean="0"/>
+              <a:t> fill the square.</a:t>
+            </a:r>
+          </a:p>
+          <a:p>
+            <a:pPr marL="457200" lvl="1" indent="0">
+              <a:buNone/>
+            </a:pPr>
+            <a:endParaRPr lang="en-IE" dirty="0" smtClean="0"/>
+          </a:p>
+          <a:p>
+            <a:pPr lvl="1"/>
+            <a:r>
+              <a:rPr lang="en-IE" dirty="0"/>
+              <a:t>If the </a:t>
+            </a:r>
+            <a:r>
+              <a:rPr lang="en-IE" dirty="0" smtClean="0"/>
+              <a:t>RIGHT button </a:t>
+            </a:r>
+            <a:r>
+              <a:rPr lang="en-IE" dirty="0"/>
+              <a:t>on the mouse is pressed, set the fill to </a:t>
+            </a:r>
+            <a:r>
+              <a:rPr lang="en-IE" dirty="0" smtClean="0"/>
+              <a:t>white and </a:t>
+            </a:r>
+            <a:r>
+              <a:rPr lang="en-IE" dirty="0"/>
+              <a:t>draw a square</a:t>
+            </a:r>
+            <a:r>
+              <a:rPr lang="en-IE" dirty="0" smtClean="0"/>
+              <a:t>. </a:t>
+            </a:r>
+            <a:r>
+              <a:rPr lang="en-IE" dirty="0"/>
+              <a:t>As soon as the  </a:t>
+            </a:r>
+            <a:r>
+              <a:rPr lang="en-IE" dirty="0" smtClean="0"/>
+              <a:t>RIGHT button </a:t>
+            </a:r>
+            <a:r>
+              <a:rPr lang="en-IE" dirty="0"/>
+              <a:t>is released, </a:t>
+            </a:r>
+            <a:r>
+              <a:rPr lang="en-IE" dirty="0" err="1"/>
+              <a:t>gray</a:t>
+            </a:r>
+            <a:r>
+              <a:rPr lang="en-IE" dirty="0"/>
+              <a:t> fill the square.</a:t>
+            </a:r>
+            <a:endParaRPr lang="en-IE" dirty="0" smtClean="0"/>
+          </a:p>
+          <a:p>
+            <a:pPr lvl="1"/>
+            <a:endParaRPr lang="en-IE" dirty="0" smtClean="0"/>
+          </a:p>
+          <a:p>
+            <a:pPr lvl="1"/>
+            <a:r>
+              <a:rPr lang="en-IE" dirty="0" smtClean="0"/>
+              <a:t>If no mouse button is pressed, set the fill to </a:t>
+            </a:r>
+            <a:r>
+              <a:rPr lang="en-IE" dirty="0" err="1" smtClean="0"/>
+              <a:t>gray</a:t>
+            </a:r>
+            <a:r>
+              <a:rPr lang="en-IE" dirty="0" smtClean="0"/>
+              <a:t> and draw a square.</a:t>
+            </a:r>
+          </a:p>
+        </p:txBody>
+      </p:sp>
+      <p:pic>
+        <p:nvPicPr>
+          <p:cNvPr id="6" name="Picture 2"/>
+          <p:cNvPicPr>
+            <a:picLocks noChangeAspect="1" noChangeArrowheads="1"/>
+          </p:cNvPicPr>
+          <p:nvPr/>
+        </p:nvPicPr>
+        <p:blipFill rotWithShape="1">
+          <a:blip r:embed="rId2">
+            <a:extLst>
+              <a:ext uri="{28A0092B-C50C-407E-A947-70E740481C1C}">
+                <a14:useLocalDpi xmlns:a14="http://schemas.microsoft.com/office/drawing/2010/main" val="0"/>
+              </a:ext>
+            </a:extLst>
+          </a:blip>
+          <a:srcRect l="20140" t="10448" r="69371" b="68879"/>
+          <a:stretch/>
+        </p:blipFill>
+        <p:spPr bwMode="auto">
+          <a:xfrm>
+            <a:off x="7368493" y="2031242"/>
+            <a:ext cx="1089707" cy="1207490"/>
+          </a:xfrm>
+          <a:prstGeom prst="rect">
+            <a:avLst/>
+          </a:prstGeom>
+          <a:noFill/>
+          <a:ln w="9525">
+            <a:solidFill>
+              <a:schemeClr val="tx1"/>
+            </a:solidFill>
+            <a:miter lim="800000"/>
+            <a:headEnd/>
+            <a:tailEnd/>
+          </a:ln>
+          <a:extLst>
+            <a:ext uri="{909E8E84-426E-40DD-AFC4-6F175D3DCCD1}">
+              <a14:hiddenFill xmlns:a14="http://schemas.microsoft.com/office/drawing/2010/main">
+                <a:solidFill>
+                  <a:schemeClr val="accent1"/>
+                </a:solidFill>
+              </a14:hiddenFill>
+            </a:ext>
+          </a:extLst>
+        </p:spPr>
+      </p:pic>
+      <p:pic>
+        <p:nvPicPr>
+          <p:cNvPr id="7" name="Picture 3"/>
+          <p:cNvPicPr>
+            <a:picLocks noChangeAspect="1" noChangeArrowheads="1"/>
+          </p:cNvPicPr>
+          <p:nvPr/>
+        </p:nvPicPr>
+        <p:blipFill rotWithShape="1">
+          <a:blip r:embed="rId3">
+            <a:extLst>
+              <a:ext uri="{28A0092B-C50C-407E-A947-70E740481C1C}">
+                <a14:useLocalDpi xmlns:a14="http://schemas.microsoft.com/office/drawing/2010/main" val="0"/>
+              </a:ext>
+            </a:extLst>
+          </a:blip>
+          <a:srcRect l="20001" t="10028" r="69300" b="68144"/>
+          <a:stretch/>
+        </p:blipFill>
+        <p:spPr bwMode="auto">
+          <a:xfrm>
+            <a:off x="7331850" y="3599597"/>
+            <a:ext cx="1126350" cy="1291989"/>
+          </a:xfrm>
+          <a:prstGeom prst="rect">
+            <a:avLst/>
+          </a:prstGeom>
+          <a:noFill/>
+          <a:ln w="9525">
+            <a:solidFill>
+              <a:schemeClr val="tx1"/>
+            </a:solidFill>
+            <a:miter lim="800000"/>
+            <a:headEnd/>
+            <a:tailEnd/>
+          </a:ln>
+          <a:extLst>
+            <a:ext uri="{909E8E84-426E-40DD-AFC4-6F175D3DCCD1}">
+              <a14:hiddenFill xmlns:a14="http://schemas.microsoft.com/office/drawing/2010/main">
+                <a:solidFill>
+                  <a:schemeClr val="accent1"/>
+                </a:solidFill>
+              </a14:hiddenFill>
+            </a:ext>
+          </a:extLst>
+        </p:spPr>
+      </p:pic>
+      <p:pic>
+        <p:nvPicPr>
+          <p:cNvPr id="8" name="Picture 2"/>
+          <p:cNvPicPr>
+            <a:picLocks noChangeAspect="1" noChangeArrowheads="1"/>
+          </p:cNvPicPr>
+          <p:nvPr/>
+        </p:nvPicPr>
+        <p:blipFill rotWithShape="1">
+          <a:blip r:embed="rId4">
+            <a:extLst>
+              <a:ext uri="{28A0092B-C50C-407E-A947-70E740481C1C}">
+                <a14:useLocalDpi xmlns:a14="http://schemas.microsoft.com/office/drawing/2010/main" val="0"/>
+              </a:ext>
+            </a:extLst>
+          </a:blip>
+          <a:srcRect l="20244" t="10448" r="69476" b="68879"/>
+          <a:stretch/>
+        </p:blipFill>
+        <p:spPr bwMode="auto">
+          <a:xfrm>
+            <a:off x="7349319" y="5181600"/>
+            <a:ext cx="1108881" cy="1253812"/>
+          </a:xfrm>
+          <a:prstGeom prst="rect">
+            <a:avLst/>
+          </a:prstGeom>
+          <a:noFill/>
+          <a:ln w="9525">
+            <a:solidFill>
+              <a:schemeClr val="tx1"/>
+            </a:solidFill>
+            <a:miter lim="800000"/>
+            <a:headEnd/>
+            <a:tailEnd/>
+          </a:ln>
+          <a:extLst>
+            <a:ext uri="{909E8E84-426E-40DD-AFC4-6F175D3DCCD1}">
+              <a14:hiddenFill xmlns:a14="http://schemas.microsoft.com/office/drawing/2010/main">
+                <a:solidFill>
+                  <a:schemeClr val="accent1"/>
+                </a:solidFill>
+              </a14:hiddenFill>
+            </a:ext>
+          </a:extLst>
+        </p:spPr>
+      </p:pic>
+    </p:spTree>
+    <p:extLst>
+      <p:ext uri="{BB962C8B-B14F-4D97-AF65-F5344CB8AC3E}">
+        <p14:creationId xmlns:p14="http://schemas.microsoft.com/office/powerpoint/2010/main" val="1832883794"/>
       </p:ext>
     </p:extLst>
   </p:cSld>

</xml_diff>